<commit_message>
Fixes in Introduction to ASP.NET MVC.pptx
</commit_message>
<xml_diff>
--- a/01. Introduction-to-ASP.NET-MVC/Introduction to ASP.NET MVC.pptx
+++ b/01. Introduction-to-ASP.NET-MVC/Introduction to ASP.NET MVC.pptx
@@ -5,10 +5,10 @@
     <p:sldMasterId id="2147483672" r:id="rId1"/>
   </p:sldMasterIdLst>
   <p:notesMasterIdLst>
-    <p:notesMasterId r:id="rId53"/>
+    <p:notesMasterId r:id="rId51"/>
   </p:notesMasterIdLst>
   <p:handoutMasterIdLst>
-    <p:handoutMasterId r:id="rId54"/>
+    <p:handoutMasterId r:id="rId52"/>
   </p:handoutMasterIdLst>
   <p:sldIdLst>
     <p:sldId id="338" r:id="rId2"/>
@@ -44,29 +44,27 @@
     <p:sldId id="365" r:id="rId32"/>
     <p:sldId id="339" r:id="rId33"/>
     <p:sldId id="345" r:id="rId34"/>
-    <p:sldId id="347" r:id="rId35"/>
-    <p:sldId id="346" r:id="rId36"/>
-    <p:sldId id="438" r:id="rId37"/>
-    <p:sldId id="439" r:id="rId38"/>
-    <p:sldId id="348" r:id="rId39"/>
-    <p:sldId id="369" r:id="rId40"/>
-    <p:sldId id="447" r:id="rId41"/>
-    <p:sldId id="372" r:id="rId42"/>
-    <p:sldId id="435" r:id="rId43"/>
-    <p:sldId id="383" r:id="rId44"/>
-    <p:sldId id="446" r:id="rId45"/>
-    <p:sldId id="437" r:id="rId46"/>
-    <p:sldId id="443" r:id="rId47"/>
-    <p:sldId id="445" r:id="rId48"/>
-    <p:sldId id="444" r:id="rId49"/>
-    <p:sldId id="370" r:id="rId50"/>
-    <p:sldId id="334" r:id="rId51"/>
-    <p:sldId id="403" r:id="rId52"/>
+    <p:sldId id="438" r:id="rId35"/>
+    <p:sldId id="439" r:id="rId36"/>
+    <p:sldId id="348" r:id="rId37"/>
+    <p:sldId id="369" r:id="rId38"/>
+    <p:sldId id="447" r:id="rId39"/>
+    <p:sldId id="372" r:id="rId40"/>
+    <p:sldId id="435" r:id="rId41"/>
+    <p:sldId id="383" r:id="rId42"/>
+    <p:sldId id="446" r:id="rId43"/>
+    <p:sldId id="437" r:id="rId44"/>
+    <p:sldId id="443" r:id="rId45"/>
+    <p:sldId id="445" r:id="rId46"/>
+    <p:sldId id="444" r:id="rId47"/>
+    <p:sldId id="370" r:id="rId48"/>
+    <p:sldId id="334" r:id="rId49"/>
+    <p:sldId id="403" r:id="rId50"/>
   </p:sldIdLst>
   <p:sldSz cx="9144000" cy="6858000" type="screen4x3"/>
   <p:notesSz cx="6881813" cy="9296400"/>
   <p:custDataLst>
-    <p:tags r:id="rId55"/>
+    <p:tags r:id="rId53"/>
   </p:custDataLst>
   <p:defaultTextStyle>
     <a:defPPr>
@@ -247,8 +245,6 @@
             <p14:sldId id="365"/>
             <p14:sldId id="339"/>
             <p14:sldId id="345"/>
-            <p14:sldId id="347"/>
-            <p14:sldId id="346"/>
             <p14:sldId id="438"/>
             <p14:sldId id="439"/>
             <p14:sldId id="348"/>
@@ -282,7 +278,7 @@
       </p14:sectionLst>
     </p:ext>
     <p:ext uri="{EFAFB233-063F-42B5-8137-9DF3F51BA10A}">
-      <p15:sldGuideLst xmlns="" xmlns:p15="http://schemas.microsoft.com/office/powerpoint/2012/main">
+      <p15:sldGuideLst xmlns:p15="http://schemas.microsoft.com/office/powerpoint/2012/main">
         <p15:guide id="1" orient="horz" pos="2160">
           <p15:clr>
             <a:srgbClr val="A4A3A4"/>
@@ -296,7 +292,7 @@
       </p15:sldGuideLst>
     </p:ext>
     <p:ext uri="{2D200454-40CA-4A62-9FC3-DE9A4176ACB9}">
-      <p15:notesGuideLst xmlns="" xmlns:p15="http://schemas.microsoft.com/office/powerpoint/2012/main">
+      <p15:notesGuideLst xmlns:p15="http://schemas.microsoft.com/office/powerpoint/2012/main">
         <p15:guide id="1" orient="horz" pos="2928">
           <p15:clr>
             <a:srgbClr val="A4A3A4"/>
@@ -428,7 +424,7 @@
             <a:fld id="{3BF7C7B5-275F-4D1F-9AB4-9255447DBC73}" type="datetimeFigureOut">
               <a:rPr lang="en-US"/>
               <a:pPr/>
-              <a:t>11/3/2014</a:t>
+              <a:t>1/30/2016</a:t>
             </a:fld>
             <a:endParaRPr lang="en-US" dirty="0"/>
           </a:p>
@@ -659,7 +655,7 @@
             <a:fld id="{9B46F231-FB2B-4655-A644-E2477325E686}" type="datetimeFigureOut">
               <a:rPr lang="en-US"/>
               <a:pPr/>
-              <a:t>11/3/2014</a:t>
+              <a:t>1/30/2016</a:t>
             </a:fld>
             <a:endParaRPr lang="en-US" dirty="0"/>
           </a:p>
@@ -1317,7 +1313,7 @@
             <a:fld id="{6FB4F6EA-423E-42DF-9292-215E7D886C4E}" type="slidenum">
               <a:rPr lang="en-US" smtClean="0"/>
               <a:pPr/>
-              <a:t>45</a:t>
+              <a:t>43</a:t>
             </a:fld>
             <a:endParaRPr lang="en-US" dirty="0"/>
           </a:p>
@@ -7928,47 +7924,6 @@
           </a:p>
         </p:txBody>
       </p:sp>
-      <p:pic>
-        <p:nvPicPr>
-          <p:cNvPr id="1026" name="Picture 2" descr="http://men.plovdivweek.com/js/ckfinder/userfiles/images/Bruklin2(2).jpg"/>
-          <p:cNvPicPr>
-            <a:picLocks noChangeAspect="1" noChangeArrowheads="1"/>
-          </p:cNvPicPr>
-          <p:nvPr/>
-        </p:nvPicPr>
-        <p:blipFill>
-          <a:blip r:embed="rId2" cstate="print">
-            <a:extLst>
-              <a:ext uri="{28A0092B-C50C-407E-A947-70E740481C1C}">
-                <a14:useLocalDpi xmlns:a14="http://schemas.microsoft.com/office/drawing/2010/main" val="0"/>
-              </a:ext>
-            </a:extLst>
-          </a:blip>
-          <a:srcRect/>
-          <a:stretch>
-            <a:fillRect/>
-          </a:stretch>
-        </p:blipFill>
-        <p:spPr bwMode="auto">
-          <a:xfrm>
-            <a:off x="7086601" y="1371600"/>
-            <a:ext cx="1543616" cy="2069653"/>
-          </a:xfrm>
-          <a:prstGeom prst="rect">
-            <a:avLst/>
-          </a:prstGeom>
-          <a:noFill/>
-          <a:extLst>
-            <a:ext uri="{909E8E84-426E-40DD-AFC4-6F175D3DCCD1}">
-              <a14:hiddenFill xmlns:a14="http://schemas.microsoft.com/office/drawing/2010/main">
-                <a:solidFill>
-                  <a:srgbClr val="FFFFFF"/>
-                </a:solidFill>
-              </a14:hiddenFill>
-            </a:ext>
-          </a:extLst>
-        </p:spPr>
-      </p:pic>
     </p:spTree>
     <p:extLst>
       <p:ext uri="{BB962C8B-B14F-4D97-AF65-F5344CB8AC3E}">
@@ -8136,42 +8091,8 @@
         </p:blipFill>
         <p:spPr>
           <a:xfrm>
-            <a:off x="746186" y="4038600"/>
-            <a:ext cx="3810000" cy="2371725"/>
-          </a:xfrm>
-          <a:prstGeom prst="rect">
-            <a:avLst/>
-          </a:prstGeom>
-          <a:ln>
-            <a:noFill/>
-          </a:ln>
-          <a:effectLst>
-            <a:outerShdw blurRad="190500" algn="tl" rotWithShape="0">
-              <a:srgbClr val="000000">
-                <a:alpha val="70000"/>
-              </a:srgbClr>
-            </a:outerShdw>
-          </a:effectLst>
-        </p:spPr>
-      </p:pic>
-      <p:pic>
-        <p:nvPicPr>
-          <p:cNvPr id="7" name="Picture 6"/>
-          <p:cNvPicPr>
-            <a:picLocks noChangeAspect="1"/>
-          </p:cNvPicPr>
-          <p:nvPr/>
-        </p:nvPicPr>
-        <p:blipFill>
-          <a:blip r:embed="rId3"/>
-          <a:stretch>
-            <a:fillRect/>
-          </a:stretch>
-        </p:blipFill>
-        <p:spPr>
-          <a:xfrm>
-            <a:off x="5241744" y="4038600"/>
-            <a:ext cx="2996724" cy="2367412"/>
+            <a:off x="2491036" y="3962400"/>
+            <a:ext cx="4161928" cy="2590800"/>
           </a:xfrm>
           <a:prstGeom prst="rect">
             <a:avLst/>
@@ -17456,8 +17377,8 @@
         </p:nvSpPr>
         <p:spPr>
           <a:xfrm>
-            <a:off x="228600" y="914400"/>
-            <a:ext cx="8839200" cy="5791200"/>
+            <a:off x="228600" y="762000"/>
+            <a:ext cx="8839200" cy="5943600"/>
           </a:xfrm>
         </p:spPr>
         <p:txBody>
@@ -17469,7 +17390,7 @@
                 <a:spcPts val="300"/>
               </a:spcBef>
               <a:spcAft>
-                <a:spcPts val="300"/>
+                <a:spcPts val="0"/>
               </a:spcAft>
             </a:pPr>
             <a:r>
@@ -17487,7 +17408,7 @@
                 <a:spcPts val="300"/>
               </a:spcBef>
               <a:spcAft>
-                <a:spcPts val="300"/>
+                <a:spcPts val="0"/>
               </a:spcAft>
             </a:pPr>
             <a:r>
@@ -17523,7 +17444,7 @@
                 <a:spcPts val="300"/>
               </a:spcBef>
               <a:spcAft>
-                <a:spcPts val="300"/>
+                <a:spcPts val="0"/>
               </a:spcAft>
             </a:pPr>
             <a:r>
@@ -17542,16 +17463,12 @@
                 <a:spcPts val="300"/>
               </a:spcBef>
               <a:spcAft>
-                <a:spcPts val="300"/>
+                <a:spcPts val="0"/>
               </a:spcAft>
             </a:pPr>
             <a:r>
               <a:rPr lang="en-US" dirty="0" smtClean="0"/>
-              <a:t>ASP.NET MVC </a:t>
-            </a:r>
-            <a:r>
-              <a:rPr lang="en-US" dirty="0" smtClean="0"/>
-              <a:t>2.0 (Areas, </a:t>
+              <a:t>ASP.NET MVC 2.0 (Areas, </a:t>
             </a:r>
             <a:r>
               <a:rPr lang="en-US" dirty="0" err="1" smtClean="0"/>
@@ -17561,7 +17478,6 @@
               <a:rPr lang="en-US" dirty="0" smtClean="0"/>
               <a:t>)</a:t>
             </a:r>
-            <a:endParaRPr lang="en-US" dirty="0" smtClean="0"/>
           </a:p>
           <a:p>
             <a:pPr lvl="1">
@@ -17569,7 +17485,7 @@
                 <a:spcPts val="300"/>
               </a:spcBef>
               <a:spcAft>
-                <a:spcPts val="300"/>
+                <a:spcPts val="0"/>
               </a:spcAft>
             </a:pPr>
             <a:r>
@@ -17591,20 +17507,12 @@
                 <a:spcPts val="300"/>
               </a:spcBef>
               <a:spcAft>
-                <a:spcPts val="300"/>
+                <a:spcPts val="0"/>
               </a:spcAft>
             </a:pPr>
             <a:r>
               <a:rPr lang="en-US" dirty="0" smtClean="0"/>
-              <a:t>ASP.NET MVC </a:t>
-            </a:r>
-            <a:r>
-              <a:rPr lang="en-US" dirty="0" smtClean="0"/>
-              <a:t>3.0 (Razor) </a:t>
-            </a:r>
-            <a:r>
-              <a:rPr lang="en-US" dirty="0" smtClean="0"/>
-              <a:t>– 13 </a:t>
+              <a:t>ASP.NET MVC 3.0 (Razor) – 13 </a:t>
             </a:r>
             <a:r>
               <a:rPr lang="en-US" dirty="0"/>
@@ -17621,24 +17529,12 @@
                 <a:spcPts val="300"/>
               </a:spcBef>
               <a:spcAft>
-                <a:spcPts val="300"/>
+                <a:spcPts val="0"/>
               </a:spcAft>
             </a:pPr>
             <a:r>
               <a:rPr lang="en-US" dirty="0" smtClean="0"/>
-              <a:t>ASP.NET MVC 4.0 </a:t>
-            </a:r>
-            <a:r>
-              <a:rPr lang="en-US" dirty="0" smtClean="0"/>
-              <a:t>(Web API) </a:t>
-            </a:r>
-            <a:r>
-              <a:rPr lang="en-US" dirty="0" smtClean="0"/>
-              <a:t>– </a:t>
-            </a:r>
-            <a:r>
-              <a:rPr lang="en-US" dirty="0" smtClean="0"/>
-              <a:t>15 August 2012</a:t>
+              <a:t>ASP.NET MVC 4.0 (Web API) – 15 August 2012</a:t>
             </a:r>
           </a:p>
           <a:p>
@@ -17647,16 +17543,12 @@
                 <a:spcPts val="300"/>
               </a:spcBef>
               <a:spcAft>
-                <a:spcPts val="300"/>
+                <a:spcPts val="0"/>
               </a:spcAft>
             </a:pPr>
             <a:r>
               <a:rPr lang="en-US" dirty="0" smtClean="0"/>
-              <a:t>ASP.NET MVC 5.0 </a:t>
-            </a:r>
-            <a:r>
-              <a:rPr lang="en-US" dirty="0" smtClean="0"/>
-              <a:t>(Identity) – </a:t>
+              <a:t>ASP.NET MVC 5.0 (Identity) – </a:t>
             </a:r>
             <a:r>
               <a:rPr lang="en-US" dirty="0"/>
@@ -17673,12 +17565,54 @@
                 <a:spcPts val="300"/>
               </a:spcBef>
               <a:spcAft>
-                <a:spcPts val="300"/>
+                <a:spcPts val="0"/>
               </a:spcAft>
             </a:pPr>
             <a:r>
+              <a:rPr lang="en-US" dirty="0"/>
+              <a:t>ASP.NET MVC </a:t>
+            </a:r>
+            <a:r>
               <a:rPr lang="en-US" dirty="0" smtClean="0"/>
-              <a:t>ASP.NET MVC 6.0 – soon enough</a:t>
+              <a:t>5.2.3 </a:t>
+            </a:r>
+            <a:r>
+              <a:rPr lang="en-US" dirty="0"/>
+              <a:t>–</a:t>
+            </a:r>
+            <a:r>
+              <a:rPr lang="en-US" dirty="0" smtClean="0"/>
+              <a:t> </a:t>
+            </a:r>
+            <a:r>
+              <a:rPr lang="en-US" dirty="0"/>
+              <a:t>9 February </a:t>
+            </a:r>
+            <a:r>
+              <a:rPr lang="en-US" dirty="0" smtClean="0"/>
+              <a:t>2015</a:t>
+            </a:r>
+          </a:p>
+          <a:p>
+            <a:pPr>
+              <a:spcBef>
+                <a:spcPts val="300"/>
+              </a:spcBef>
+              <a:spcAft>
+                <a:spcPts val="0"/>
+              </a:spcAft>
+            </a:pPr>
+            <a:r>
+              <a:rPr lang="en-US" dirty="0" smtClean="0"/>
+              <a:t>ASP.NET Core 1.0 </a:t>
+            </a:r>
+            <a:r>
+              <a:rPr lang="en-US" dirty="0" smtClean="0"/>
+              <a:t>– </a:t>
+            </a:r>
+            <a:r>
+              <a:rPr lang="en-US" dirty="0" smtClean="0"/>
+              <a:t>Some time in 2016</a:t>
             </a:r>
             <a:endParaRPr lang="en-US" dirty="0"/>
           </a:p>
@@ -18237,6 +18171,67 @@
                       </p:childTnLst>
                     </p:cTn>
                   </p:par>
+                  <p:par>
+                    <p:cTn id="42" fill="hold">
+                      <p:stCondLst>
+                        <p:cond delay="indefinite"/>
+                      </p:stCondLst>
+                      <p:childTnLst>
+                        <p:par>
+                          <p:cTn id="43" fill="hold">
+                            <p:stCondLst>
+                              <p:cond delay="0"/>
+                            </p:stCondLst>
+                            <p:childTnLst>
+                              <p:par>
+                                <p:cTn id="44" presetID="10" presetClass="entr" presetSubtype="0" fill="hold" grpId="0" nodeType="clickEffect">
+                                  <p:stCondLst>
+                                    <p:cond delay="0"/>
+                                  </p:stCondLst>
+                                  <p:childTnLst>
+                                    <p:set>
+                                      <p:cBhvr>
+                                        <p:cTn id="45" dur="1" fill="hold">
+                                          <p:stCondLst>
+                                            <p:cond delay="0"/>
+                                          </p:stCondLst>
+                                        </p:cTn>
+                                        <p:tgtEl>
+                                          <p:spTgt spid="3">
+                                            <p:txEl>
+                                              <p:pRg st="9" end="9"/>
+                                            </p:txEl>
+                                          </p:spTgt>
+                                        </p:tgtEl>
+                                        <p:attrNameLst>
+                                          <p:attrName>style.visibility</p:attrName>
+                                        </p:attrNameLst>
+                                      </p:cBhvr>
+                                      <p:to>
+                                        <p:strVal val="visible"/>
+                                      </p:to>
+                                    </p:set>
+                                    <p:animEffect transition="in" filter="fade">
+                                      <p:cBhvr>
+                                        <p:cTn id="46" dur="500"/>
+                                        <p:tgtEl>
+                                          <p:spTgt spid="3">
+                                            <p:txEl>
+                                              <p:pRg st="9" end="9"/>
+                                            </p:txEl>
+                                          </p:spTgt>
+                                        </p:tgtEl>
+                                      </p:cBhvr>
+                                    </p:animEffect>
+                                  </p:childTnLst>
+                                </p:cTn>
+                              </p:par>
+                            </p:childTnLst>
+                          </p:cTn>
+                        </p:par>
+                      </p:childTnLst>
+                    </p:cTn>
+                  </p:par>
                 </p:childTnLst>
               </p:cTn>
               <p:prevCondLst>
@@ -19640,28 +19635,7 @@
                   </a:outerShdw>
                 </a:effectLst>
               </a:rPr>
-              <a:t>/</a:t>
-            </a:r>
-            <a:r>
-              <a:rPr lang="en-US" sz="2800" b="1" dirty="0" smtClean="0">
-                <a:ln w="9525">
-                  <a:solidFill>
-                    <a:schemeClr val="bg1"/>
-                  </a:solidFill>
-                  <a:prstDash val="solid"/>
-                </a:ln>
-                <a:solidFill>
-                  <a:schemeClr val="tx1"/>
-                </a:solidFill>
-                <a:effectLst>
-                  <a:outerShdw blurRad="12700" dist="38100" dir="2700000" algn="tl" rotWithShape="0">
-                    <a:schemeClr val="bg1">
-                      <a:lumMod val="50000"/>
-                    </a:schemeClr>
-                  </a:outerShdw>
-                </a:effectLst>
-              </a:rPr>
-              <a:t>Users/Ivo/</a:t>
+              <a:t>/Users/Ivo/</a:t>
             </a:r>
             <a:endParaRPr lang="en-US" sz="3600" b="1" dirty="0">
               <a:ln w="9525">
@@ -22218,7 +22192,15 @@
             </a:pPr>
             <a:r>
               <a:rPr lang="en-US" dirty="0" smtClean="0"/>
-              <a:t>Tools that we need:</a:t>
+              <a:t>Tools that </a:t>
+            </a:r>
+            <a:r>
+              <a:rPr lang="en-US" dirty="0" smtClean="0"/>
+              <a:t>you need</a:t>
+            </a:r>
+            <a:r>
+              <a:rPr lang="en-US" dirty="0" smtClean="0"/>
+              <a:t>:</a:t>
             </a:r>
           </a:p>
           <a:p>
@@ -22232,8 +22214,13 @@
             </a:pPr>
             <a:r>
               <a:rPr lang="en-US" dirty="0" smtClean="0"/>
-              <a:t>IDE: Visual Studio 2013 (2012 is also OK)</a:t>
-            </a:r>
+              <a:t>IDE: Visual Studio </a:t>
+            </a:r>
+            <a:r>
+              <a:rPr lang="en-US" dirty="0" smtClean="0"/>
+              <a:t>2015 with Update 1</a:t>
+            </a:r>
+            <a:endParaRPr lang="en-US" dirty="0" smtClean="0"/>
           </a:p>
           <a:p>
             <a:pPr lvl="1">
@@ -22246,8 +22233,13 @@
             </a:pPr>
             <a:r>
               <a:rPr lang="en-US" dirty="0" smtClean="0"/>
-              <a:t>Framework: .NET Framework 4.5</a:t>
-            </a:r>
+              <a:t>Framework: .NET Framework </a:t>
+            </a:r>
+            <a:r>
+              <a:rPr lang="en-US" dirty="0" smtClean="0"/>
+              <a:t>4.6</a:t>
+            </a:r>
+            <a:endParaRPr lang="en-US" dirty="0" smtClean="0"/>
           </a:p>
           <a:p>
             <a:pPr lvl="1">
@@ -22260,8 +22252,21 @@
             </a:pPr>
             <a:r>
               <a:rPr lang="en-US" dirty="0" smtClean="0"/>
-              <a:t>Web server: IIS 8.5 (Express)</a:t>
-            </a:r>
+              <a:t>Web server: IIS </a:t>
+            </a:r>
+            <a:r>
+              <a:rPr lang="en-US" dirty="0" smtClean="0"/>
+              <a:t>Express</a:t>
+            </a:r>
+            <a:r>
+              <a:rPr lang="en-US" dirty="0"/>
+              <a:t> </a:t>
+            </a:r>
+            <a:r>
+              <a:rPr lang="en-US" dirty="0" smtClean="0"/>
+              <a:t>(included in VS)</a:t>
+            </a:r>
+            <a:endParaRPr lang="en-US" dirty="0" smtClean="0"/>
           </a:p>
           <a:p>
             <a:pPr lvl="1">
@@ -22296,7 +22301,11 @@
             </a:pPr>
             <a:r>
               <a:rPr lang="en-US" dirty="0" smtClean="0"/>
-              <a:t>Visual Studio installer will install everything we need</a:t>
+              <a:t>Visual Studio installer will install everything </a:t>
+            </a:r>
+            <a:r>
+              <a:rPr lang="en-US" dirty="0" smtClean="0"/>
+              <a:t>you need</a:t>
             </a:r>
             <a:endParaRPr lang="en-US" dirty="0" smtClean="0">
               <a:hlinkClick r:id="rId2"/>
@@ -22315,13 +22324,13 @@
               <a:rPr lang="en-US" dirty="0">
                 <a:hlinkClick r:id="rId3"/>
               </a:rPr>
-              <a:t>http://</a:t>
+              <a:t>https://</a:t>
             </a:r>
             <a:r>
               <a:rPr lang="en-US" dirty="0" smtClean="0">
                 <a:hlinkClick r:id="rId3"/>
               </a:rPr>
-              <a:t>www.microsoft.com/visualstudio/eng/2013-downloads</a:t>
+              <a:t>www.visualstudio.com/downloads/download-visual-studio-vs</a:t>
             </a:r>
             <a:endParaRPr lang="en-US" dirty="0" smtClean="0"/>
           </a:p>
@@ -22623,7 +22632,15 @@
           <a:p>
             <a:r>
               <a:rPr lang="en-US" dirty="0" smtClean="0"/>
-              <a:t>Visual Studio 2012: New Project</a:t>
+              <a:t>Visual Studio </a:t>
+            </a:r>
+            <a:r>
+              <a:rPr lang="en-US" dirty="0" smtClean="0"/>
+              <a:t>2015: </a:t>
+            </a:r>
+            <a:r>
+              <a:rPr lang="en-US" dirty="0" smtClean="0"/>
+              <a:t>New Project</a:t>
             </a:r>
             <a:endParaRPr lang="en-US" dirty="0"/>
           </a:p>
@@ -22653,676 +22670,6 @@
                 <a:defRPr/>
               </a:pPr>
               <a:t>34</a:t>
-            </a:fld>
-            <a:endParaRPr lang="en-US" dirty="0"/>
-          </a:p>
-        </p:txBody>
-      </p:sp>
-      <p:pic>
-        <p:nvPicPr>
-          <p:cNvPr id="6" name="Picture 5"/>
-          <p:cNvPicPr>
-            <a:picLocks noChangeAspect="1"/>
-          </p:cNvPicPr>
-          <p:nvPr/>
-        </p:nvPicPr>
-        <p:blipFill>
-          <a:blip r:embed="rId2"/>
-          <a:stretch>
-            <a:fillRect/>
-          </a:stretch>
-        </p:blipFill>
-        <p:spPr>
-          <a:xfrm>
-            <a:off x="1524000" y="906080"/>
-            <a:ext cx="6134100" cy="971550"/>
-          </a:xfrm>
-          <a:prstGeom prst="rect">
-            <a:avLst/>
-          </a:prstGeom>
-          <a:ln>
-            <a:noFill/>
-          </a:ln>
-          <a:effectLst>
-            <a:outerShdw blurRad="292100" dist="139700" dir="2700000" algn="tl" rotWithShape="0">
-              <a:srgbClr val="333333">
-                <a:alpha val="65000"/>
-              </a:srgbClr>
-            </a:outerShdw>
-          </a:effectLst>
-        </p:spPr>
-      </p:pic>
-      <p:pic>
-        <p:nvPicPr>
-          <p:cNvPr id="12" name="Picture 11"/>
-          <p:cNvPicPr>
-            <a:picLocks noChangeAspect="1"/>
-          </p:cNvPicPr>
-          <p:nvPr/>
-        </p:nvPicPr>
-        <p:blipFill>
-          <a:blip r:embed="rId3"/>
-          <a:stretch>
-            <a:fillRect/>
-          </a:stretch>
-        </p:blipFill>
-        <p:spPr>
-          <a:xfrm>
-            <a:off x="228600" y="1981200"/>
-            <a:ext cx="6294486" cy="3632471"/>
-          </a:xfrm>
-          <a:prstGeom prst="roundRect">
-            <a:avLst>
-              <a:gd name="adj" fmla="val 0"/>
-            </a:avLst>
-          </a:prstGeom>
-          <a:solidFill>
-            <a:srgbClr val="FFFFFF">
-              <a:shade val="85000"/>
-            </a:srgbClr>
-          </a:solidFill>
-          <a:ln>
-            <a:noFill/>
-          </a:ln>
-          <a:effectLst>
-            <a:reflection blurRad="12700" stA="38000" endPos="28000" dist="5000" dir="5400000" sy="-100000" algn="bl" rotWithShape="0"/>
-          </a:effectLst>
-        </p:spPr>
-      </p:pic>
-      <p:pic>
-        <p:nvPicPr>
-          <p:cNvPr id="9" name="Picture 8"/>
-          <p:cNvPicPr>
-            <a:picLocks noChangeAspect="1"/>
-          </p:cNvPicPr>
-          <p:nvPr/>
-        </p:nvPicPr>
-        <p:blipFill>
-          <a:blip r:embed="rId4"/>
-          <a:stretch>
-            <a:fillRect/>
-          </a:stretch>
-        </p:blipFill>
-        <p:spPr>
-          <a:xfrm>
-            <a:off x="4782566" y="2819400"/>
-            <a:ext cx="4132834" cy="3715871"/>
-          </a:xfrm>
-          <a:prstGeom prst="rect">
-            <a:avLst/>
-          </a:prstGeom>
-          <a:ln>
-            <a:noFill/>
-          </a:ln>
-          <a:effectLst>
-            <a:outerShdw blurRad="190500" algn="tl" rotWithShape="0">
-              <a:srgbClr val="000000">
-                <a:alpha val="70000"/>
-              </a:srgbClr>
-            </a:outerShdw>
-          </a:effectLst>
-        </p:spPr>
-      </p:pic>
-    </p:spTree>
-    <p:extLst>
-      <p:ext uri="{BB962C8B-B14F-4D97-AF65-F5344CB8AC3E}">
-        <p14:creationId xmlns:p14="http://schemas.microsoft.com/office/powerpoint/2010/main" val="1145494060"/>
-      </p:ext>
-    </p:extLst>
-  </p:cSld>
-  <p:clrMapOvr>
-    <a:masterClrMapping/>
-  </p:clrMapOvr>
-  <p:timing>
-    <p:tnLst>
-      <p:par>
-        <p:cTn id="1" dur="indefinite" restart="never" nodeType="tmRoot">
-          <p:childTnLst>
-            <p:seq concurrent="1" nextAc="seek">
-              <p:cTn id="2" dur="indefinite" nodeType="mainSeq">
-                <p:childTnLst>
-                  <p:par>
-                    <p:cTn id="3" fill="hold">
-                      <p:stCondLst>
-                        <p:cond delay="indefinite"/>
-                      </p:stCondLst>
-                      <p:childTnLst>
-                        <p:par>
-                          <p:cTn id="4" fill="hold">
-                            <p:stCondLst>
-                              <p:cond delay="0"/>
-                            </p:stCondLst>
-                            <p:childTnLst>
-                              <p:par>
-                                <p:cTn id="5" presetID="10" presetClass="entr" presetSubtype="0" fill="hold" nodeType="clickEffect">
-                                  <p:stCondLst>
-                                    <p:cond delay="0"/>
-                                  </p:stCondLst>
-                                  <p:childTnLst>
-                                    <p:set>
-                                      <p:cBhvr>
-                                        <p:cTn id="6" dur="1" fill="hold">
-                                          <p:stCondLst>
-                                            <p:cond delay="0"/>
-                                          </p:stCondLst>
-                                        </p:cTn>
-                                        <p:tgtEl>
-                                          <p:spTgt spid="6"/>
-                                        </p:tgtEl>
-                                        <p:attrNameLst>
-                                          <p:attrName>style.visibility</p:attrName>
-                                        </p:attrNameLst>
-                                      </p:cBhvr>
-                                      <p:to>
-                                        <p:strVal val="visible"/>
-                                      </p:to>
-                                    </p:set>
-                                    <p:animEffect transition="in" filter="fade">
-                                      <p:cBhvr>
-                                        <p:cTn id="7" dur="500"/>
-                                        <p:tgtEl>
-                                          <p:spTgt spid="6"/>
-                                        </p:tgtEl>
-                                      </p:cBhvr>
-                                    </p:animEffect>
-                                  </p:childTnLst>
-                                </p:cTn>
-                              </p:par>
-                            </p:childTnLst>
-                          </p:cTn>
-                        </p:par>
-                      </p:childTnLst>
-                    </p:cTn>
-                  </p:par>
-                  <p:par>
-                    <p:cTn id="8" fill="hold">
-                      <p:stCondLst>
-                        <p:cond delay="indefinite"/>
-                      </p:stCondLst>
-                      <p:childTnLst>
-                        <p:par>
-                          <p:cTn id="9" fill="hold">
-                            <p:stCondLst>
-                              <p:cond delay="0"/>
-                            </p:stCondLst>
-                            <p:childTnLst>
-                              <p:par>
-                                <p:cTn id="10" presetID="10" presetClass="entr" presetSubtype="0" fill="hold" nodeType="clickEffect">
-                                  <p:stCondLst>
-                                    <p:cond delay="0"/>
-                                  </p:stCondLst>
-                                  <p:childTnLst>
-                                    <p:set>
-                                      <p:cBhvr>
-                                        <p:cTn id="11" dur="1" fill="hold">
-                                          <p:stCondLst>
-                                            <p:cond delay="0"/>
-                                          </p:stCondLst>
-                                        </p:cTn>
-                                        <p:tgtEl>
-                                          <p:spTgt spid="12"/>
-                                        </p:tgtEl>
-                                        <p:attrNameLst>
-                                          <p:attrName>style.visibility</p:attrName>
-                                        </p:attrNameLst>
-                                      </p:cBhvr>
-                                      <p:to>
-                                        <p:strVal val="visible"/>
-                                      </p:to>
-                                    </p:set>
-                                    <p:animEffect transition="in" filter="fade">
-                                      <p:cBhvr>
-                                        <p:cTn id="12" dur="500"/>
-                                        <p:tgtEl>
-                                          <p:spTgt spid="12"/>
-                                        </p:tgtEl>
-                                      </p:cBhvr>
-                                    </p:animEffect>
-                                  </p:childTnLst>
-                                </p:cTn>
-                              </p:par>
-                            </p:childTnLst>
-                          </p:cTn>
-                        </p:par>
-                      </p:childTnLst>
-                    </p:cTn>
-                  </p:par>
-                  <p:par>
-                    <p:cTn id="13" fill="hold">
-                      <p:stCondLst>
-                        <p:cond delay="indefinite"/>
-                      </p:stCondLst>
-                      <p:childTnLst>
-                        <p:par>
-                          <p:cTn id="14" fill="hold">
-                            <p:stCondLst>
-                              <p:cond delay="0"/>
-                            </p:stCondLst>
-                            <p:childTnLst>
-                              <p:par>
-                                <p:cTn id="15" presetID="10" presetClass="entr" presetSubtype="0" fill="hold" nodeType="clickEffect">
-                                  <p:stCondLst>
-                                    <p:cond delay="0"/>
-                                  </p:stCondLst>
-                                  <p:childTnLst>
-                                    <p:set>
-                                      <p:cBhvr>
-                                        <p:cTn id="16" dur="1" fill="hold">
-                                          <p:stCondLst>
-                                            <p:cond delay="0"/>
-                                          </p:stCondLst>
-                                        </p:cTn>
-                                        <p:tgtEl>
-                                          <p:spTgt spid="9"/>
-                                        </p:tgtEl>
-                                        <p:attrNameLst>
-                                          <p:attrName>style.visibility</p:attrName>
-                                        </p:attrNameLst>
-                                      </p:cBhvr>
-                                      <p:to>
-                                        <p:strVal val="visible"/>
-                                      </p:to>
-                                    </p:set>
-                                    <p:animEffect transition="in" filter="fade">
-                                      <p:cBhvr>
-                                        <p:cTn id="17" dur="500"/>
-                                        <p:tgtEl>
-                                          <p:spTgt spid="9"/>
-                                        </p:tgtEl>
-                                      </p:cBhvr>
-                                    </p:animEffect>
-                                  </p:childTnLst>
-                                </p:cTn>
-                              </p:par>
-                            </p:childTnLst>
-                          </p:cTn>
-                        </p:par>
-                      </p:childTnLst>
-                    </p:cTn>
-                  </p:par>
-                </p:childTnLst>
-              </p:cTn>
-              <p:prevCondLst>
-                <p:cond evt="onPrev" delay="0">
-                  <p:tgtEl>
-                    <p:sldTgt/>
-                  </p:tgtEl>
-                </p:cond>
-              </p:prevCondLst>
-              <p:nextCondLst>
-                <p:cond evt="onNext" delay="0">
-                  <p:tgtEl>
-                    <p:sldTgt/>
-                  </p:tgtEl>
-                </p:cond>
-              </p:nextCondLst>
-            </p:seq>
-          </p:childTnLst>
-        </p:cTn>
-      </p:par>
-    </p:tnLst>
-  </p:timing>
-</p:sld>
-</file>
-
-<file path=ppt/slides/slide35.xml><?xml version="1.0" encoding="utf-8"?>
-<p:sld xmlns:a="http://schemas.openxmlformats.org/drawingml/2006/main" xmlns:r="http://schemas.openxmlformats.org/officeDocument/2006/relationships" xmlns:p="http://schemas.openxmlformats.org/presentationml/2006/main">
-  <p:cSld>
-    <p:spTree>
-      <p:nvGrpSpPr>
-        <p:cNvPr id="1" name=""/>
-        <p:cNvGrpSpPr/>
-        <p:nvPr/>
-      </p:nvGrpSpPr>
-      <p:grpSpPr>
-        <a:xfrm>
-          <a:off x="0" y="0"/>
-          <a:ext cx="0" cy="0"/>
-          <a:chOff x="0" y="0"/>
-          <a:chExt cx="0" cy="0"/>
-        </a:xfrm>
-      </p:grpSpPr>
-      <p:sp>
-        <p:nvSpPr>
-          <p:cNvPr id="2" name="Title 1"/>
-          <p:cNvSpPr>
-            <a:spLocks noGrp="1"/>
-          </p:cNvSpPr>
-          <p:nvPr>
-            <p:ph type="title"/>
-          </p:nvPr>
-        </p:nvSpPr>
-        <p:spPr/>
-        <p:txBody>
-          <a:bodyPr/>
-          <a:lstStyle/>
-          <a:p>
-            <a:r>
-              <a:rPr lang="en-US" dirty="0" smtClean="0"/>
-              <a:t>VS 2012: Default Layout</a:t>
-            </a:r>
-            <a:endParaRPr lang="en-US" dirty="0"/>
-          </a:p>
-        </p:txBody>
-      </p:sp>
-      <p:sp>
-        <p:nvSpPr>
-          <p:cNvPr id="4" name="Slide Number Placeholder 3"/>
-          <p:cNvSpPr>
-            <a:spLocks noGrp="1"/>
-          </p:cNvSpPr>
-          <p:nvPr>
-            <p:ph type="sldNum" sz="quarter" idx="10"/>
-          </p:nvPr>
-        </p:nvSpPr>
-        <p:spPr/>
-        <p:txBody>
-          <a:bodyPr/>
-          <a:lstStyle/>
-          <a:p>
-            <a:pPr>
-              <a:defRPr/>
-            </a:pPr>
-            <a:fld id="{58452FF4-89E3-4D1B-9927-2DBDC00E58D7}" type="slidenum">
-              <a:rPr lang="en-US" smtClean="0"/>
-              <a:pPr>
-                <a:defRPr/>
-              </a:pPr>
-              <a:t>35</a:t>
-            </a:fld>
-            <a:endParaRPr lang="en-US" dirty="0"/>
-          </a:p>
-        </p:txBody>
-      </p:sp>
-      <p:pic>
-        <p:nvPicPr>
-          <p:cNvPr id="6" name="Picture 5"/>
-          <p:cNvPicPr>
-            <a:picLocks noChangeAspect="1"/>
-          </p:cNvPicPr>
-          <p:nvPr/>
-        </p:nvPicPr>
-        <p:blipFill>
-          <a:blip r:embed="rId2"/>
-          <a:stretch>
-            <a:fillRect/>
-          </a:stretch>
-        </p:blipFill>
-        <p:spPr>
-          <a:xfrm>
-            <a:off x="304800" y="1066800"/>
-            <a:ext cx="7239000" cy="4343400"/>
-          </a:xfrm>
-          <a:prstGeom prst="roundRect">
-            <a:avLst>
-              <a:gd name="adj" fmla="val 0"/>
-            </a:avLst>
-          </a:prstGeom>
-          <a:solidFill>
-            <a:srgbClr val="FFFFFF">
-              <a:shade val="85000"/>
-            </a:srgbClr>
-          </a:solidFill>
-          <a:ln>
-            <a:noFill/>
-          </a:ln>
-          <a:effectLst>
-            <a:reflection blurRad="12700" stA="38000" endPos="28000" dist="5000" dir="5400000" sy="-100000" algn="bl" rotWithShape="0"/>
-          </a:effectLst>
-        </p:spPr>
-      </p:pic>
-      <p:pic>
-        <p:nvPicPr>
-          <p:cNvPr id="7" name="Picture 6"/>
-          <p:cNvPicPr>
-            <a:picLocks noChangeAspect="1"/>
-          </p:cNvPicPr>
-          <p:nvPr/>
-        </p:nvPicPr>
-        <p:blipFill>
-          <a:blip r:embed="rId3"/>
-          <a:stretch>
-            <a:fillRect/>
-          </a:stretch>
-        </p:blipFill>
-        <p:spPr>
-          <a:xfrm>
-            <a:off x="2514600" y="2895600"/>
-            <a:ext cx="6324600" cy="3579226"/>
-          </a:xfrm>
-          <a:prstGeom prst="rect">
-            <a:avLst/>
-          </a:prstGeom>
-          <a:ln>
-            <a:noFill/>
-          </a:ln>
-          <a:effectLst>
-            <a:outerShdw blurRad="190500" algn="tl" rotWithShape="0">
-              <a:srgbClr val="000000">
-                <a:alpha val="70000"/>
-              </a:srgbClr>
-            </a:outerShdw>
-          </a:effectLst>
-        </p:spPr>
-      </p:pic>
-    </p:spTree>
-    <p:extLst>
-      <p:ext uri="{BB962C8B-B14F-4D97-AF65-F5344CB8AC3E}">
-        <p14:creationId xmlns:p14="http://schemas.microsoft.com/office/powerpoint/2010/main" val="775213755"/>
-      </p:ext>
-    </p:extLst>
-  </p:cSld>
-  <p:clrMapOvr>
-    <a:masterClrMapping/>
-  </p:clrMapOvr>
-  <p:timing>
-    <p:tnLst>
-      <p:par>
-        <p:cTn id="1" dur="indefinite" restart="never" nodeType="tmRoot">
-          <p:childTnLst>
-            <p:seq concurrent="1" nextAc="seek">
-              <p:cTn id="2" dur="indefinite" nodeType="mainSeq">
-                <p:childTnLst>
-                  <p:par>
-                    <p:cTn id="3" fill="hold">
-                      <p:stCondLst>
-                        <p:cond delay="indefinite"/>
-                      </p:stCondLst>
-                      <p:childTnLst>
-                        <p:par>
-                          <p:cTn id="4" fill="hold">
-                            <p:stCondLst>
-                              <p:cond delay="0"/>
-                            </p:stCondLst>
-                            <p:childTnLst>
-                              <p:par>
-                                <p:cTn id="5" presetID="10" presetClass="entr" presetSubtype="0" fill="hold" nodeType="clickEffect">
-                                  <p:stCondLst>
-                                    <p:cond delay="0"/>
-                                  </p:stCondLst>
-                                  <p:childTnLst>
-                                    <p:set>
-                                      <p:cBhvr>
-                                        <p:cTn id="6" dur="1" fill="hold">
-                                          <p:stCondLst>
-                                            <p:cond delay="0"/>
-                                          </p:stCondLst>
-                                        </p:cTn>
-                                        <p:tgtEl>
-                                          <p:spTgt spid="6"/>
-                                        </p:tgtEl>
-                                        <p:attrNameLst>
-                                          <p:attrName>style.visibility</p:attrName>
-                                        </p:attrNameLst>
-                                      </p:cBhvr>
-                                      <p:to>
-                                        <p:strVal val="visible"/>
-                                      </p:to>
-                                    </p:set>
-                                    <p:animEffect transition="in" filter="fade">
-                                      <p:cBhvr>
-                                        <p:cTn id="7" dur="500"/>
-                                        <p:tgtEl>
-                                          <p:spTgt spid="6"/>
-                                        </p:tgtEl>
-                                      </p:cBhvr>
-                                    </p:animEffect>
-                                  </p:childTnLst>
-                                </p:cTn>
-                              </p:par>
-                            </p:childTnLst>
-                          </p:cTn>
-                        </p:par>
-                      </p:childTnLst>
-                    </p:cTn>
-                  </p:par>
-                  <p:par>
-                    <p:cTn id="8" fill="hold">
-                      <p:stCondLst>
-                        <p:cond delay="indefinite"/>
-                      </p:stCondLst>
-                      <p:childTnLst>
-                        <p:par>
-                          <p:cTn id="9" fill="hold">
-                            <p:stCondLst>
-                              <p:cond delay="0"/>
-                            </p:stCondLst>
-                            <p:childTnLst>
-                              <p:par>
-                                <p:cTn id="10" presetID="10" presetClass="entr" presetSubtype="0" fill="hold" nodeType="clickEffect">
-                                  <p:stCondLst>
-                                    <p:cond delay="0"/>
-                                  </p:stCondLst>
-                                  <p:childTnLst>
-                                    <p:set>
-                                      <p:cBhvr>
-                                        <p:cTn id="11" dur="1" fill="hold">
-                                          <p:stCondLst>
-                                            <p:cond delay="0"/>
-                                          </p:stCondLst>
-                                        </p:cTn>
-                                        <p:tgtEl>
-                                          <p:spTgt spid="7"/>
-                                        </p:tgtEl>
-                                        <p:attrNameLst>
-                                          <p:attrName>style.visibility</p:attrName>
-                                        </p:attrNameLst>
-                                      </p:cBhvr>
-                                      <p:to>
-                                        <p:strVal val="visible"/>
-                                      </p:to>
-                                    </p:set>
-                                    <p:animEffect transition="in" filter="fade">
-                                      <p:cBhvr>
-                                        <p:cTn id="12" dur="500"/>
-                                        <p:tgtEl>
-                                          <p:spTgt spid="7"/>
-                                        </p:tgtEl>
-                                      </p:cBhvr>
-                                    </p:animEffect>
-                                  </p:childTnLst>
-                                </p:cTn>
-                              </p:par>
-                            </p:childTnLst>
-                          </p:cTn>
-                        </p:par>
-                      </p:childTnLst>
-                    </p:cTn>
-                  </p:par>
-                </p:childTnLst>
-              </p:cTn>
-              <p:prevCondLst>
-                <p:cond evt="onPrev" delay="0">
-                  <p:tgtEl>
-                    <p:sldTgt/>
-                  </p:tgtEl>
-                </p:cond>
-              </p:prevCondLst>
-              <p:nextCondLst>
-                <p:cond evt="onNext" delay="0">
-                  <p:tgtEl>
-                    <p:sldTgt/>
-                  </p:tgtEl>
-                </p:cond>
-              </p:nextCondLst>
-            </p:seq>
-          </p:childTnLst>
-        </p:cTn>
-      </p:par>
-    </p:tnLst>
-  </p:timing>
-</p:sld>
-</file>
-
-<file path=ppt/slides/slide36.xml><?xml version="1.0" encoding="utf-8"?>
-<p:sld xmlns:a="http://schemas.openxmlformats.org/drawingml/2006/main" xmlns:r="http://schemas.openxmlformats.org/officeDocument/2006/relationships" xmlns:p="http://schemas.openxmlformats.org/presentationml/2006/main">
-  <p:cSld>
-    <p:spTree>
-      <p:nvGrpSpPr>
-        <p:cNvPr id="1" name=""/>
-        <p:cNvGrpSpPr/>
-        <p:nvPr/>
-      </p:nvGrpSpPr>
-      <p:grpSpPr>
-        <a:xfrm>
-          <a:off x="0" y="0"/>
-          <a:ext cx="0" cy="0"/>
-          <a:chOff x="0" y="0"/>
-          <a:chExt cx="0" cy="0"/>
-        </a:xfrm>
-      </p:grpSpPr>
-      <p:sp>
-        <p:nvSpPr>
-          <p:cNvPr id="2" name="Title 1"/>
-          <p:cNvSpPr>
-            <a:spLocks noGrp="1"/>
-          </p:cNvSpPr>
-          <p:nvPr>
-            <p:ph type="title"/>
-          </p:nvPr>
-        </p:nvSpPr>
-        <p:spPr>
-          <a:xfrm>
-            <a:off x="1828800" y="76200"/>
-            <a:ext cx="7239000" cy="838200"/>
-          </a:xfrm>
-        </p:spPr>
-        <p:txBody>
-          <a:bodyPr/>
-          <a:lstStyle/>
-          <a:p>
-            <a:r>
-              <a:rPr lang="en-US" dirty="0" smtClean="0"/>
-              <a:t>Visual Studio 2013: New Project</a:t>
-            </a:r>
-            <a:endParaRPr lang="en-US" dirty="0"/>
-          </a:p>
-        </p:txBody>
-      </p:sp>
-      <p:sp>
-        <p:nvSpPr>
-          <p:cNvPr id="4" name="Slide Number Placeholder 3"/>
-          <p:cNvSpPr>
-            <a:spLocks noGrp="1"/>
-          </p:cNvSpPr>
-          <p:nvPr>
-            <p:ph type="sldNum" sz="quarter" idx="10"/>
-          </p:nvPr>
-        </p:nvSpPr>
-        <p:spPr/>
-        <p:txBody>
-          <a:bodyPr/>
-          <a:lstStyle/>
-          <a:p>
-            <a:pPr>
-              <a:defRPr/>
-            </a:pPr>
-            <a:fld id="{58452FF4-89E3-4D1B-9927-2DBDC00E58D7}" type="slidenum">
-              <a:rPr lang="en-US" smtClean="0"/>
-              <a:pPr>
-                <a:defRPr/>
-              </a:pPr>
-              <a:t>36</a:t>
             </a:fld>
             <a:endParaRPr lang="en-US" dirty="0"/>
           </a:p>
@@ -23722,7 +23069,7 @@
 </p:sld>
 </file>
 
-<file path=ppt/slides/slide37.xml><?xml version="1.0" encoding="utf-8"?>
+<file path=ppt/slides/slide35.xml><?xml version="1.0" encoding="utf-8"?>
 <p:sld xmlns:a="http://schemas.openxmlformats.org/drawingml/2006/main" xmlns:r="http://schemas.openxmlformats.org/officeDocument/2006/relationships" xmlns:p="http://schemas.openxmlformats.org/presentationml/2006/main">
   <p:cSld>
     <p:spTree>
@@ -23756,7 +23103,15 @@
           <a:p>
             <a:r>
               <a:rPr lang="en-US" dirty="0" smtClean="0"/>
-              <a:t>VS 2013: Default Layout</a:t>
+              <a:t>VS </a:t>
+            </a:r>
+            <a:r>
+              <a:rPr lang="en-US" dirty="0" smtClean="0"/>
+              <a:t>2015: </a:t>
+            </a:r>
+            <a:r>
+              <a:rPr lang="en-US" dirty="0" smtClean="0"/>
+              <a:t>Default Layout</a:t>
             </a:r>
             <a:endParaRPr lang="en-US" dirty="0"/>
           </a:p>
@@ -23785,7 +23140,7 @@
               <a:pPr>
                 <a:defRPr/>
               </a:pPr>
-              <a:t>37</a:t>
+              <a:t>35</a:t>
             </a:fld>
             <a:endParaRPr lang="en-US" dirty="0"/>
           </a:p>
@@ -24098,7 +23453,7 @@
 </p:sld>
 </file>
 
-<file path=ppt/slides/slide38.xml><?xml version="1.0" encoding="utf-8"?>
+<file path=ppt/slides/slide36.xml><?xml version="1.0" encoding="utf-8"?>
 <p:sld xmlns:a="http://schemas.openxmlformats.org/drawingml/2006/main" xmlns:r="http://schemas.openxmlformats.org/officeDocument/2006/relationships" xmlns:p="http://schemas.openxmlformats.org/presentationml/2006/main">
   <p:cSld>
     <p:spTree>
@@ -24189,7 +23544,7 @@
               <a:pPr>
                 <a:defRPr/>
               </a:pPr>
-              <a:t>38</a:t>
+              <a:t>36</a:t>
             </a:fld>
             <a:endParaRPr lang="en-US" dirty="0"/>
           </a:p>
@@ -25801,7 +25156,7 @@
 </p:sld>
 </file>
 
-<file path=ppt/slides/slide39.xml><?xml version="1.0" encoding="utf-8"?>
+<file path=ppt/slides/slide37.xml><?xml version="1.0" encoding="utf-8"?>
 <p:sld xmlns:a="http://schemas.openxmlformats.org/drawingml/2006/main" xmlns:r="http://schemas.openxmlformats.org/officeDocument/2006/relationships" xmlns:p="http://schemas.openxmlformats.org/presentationml/2006/main">
   <p:cSld>
     <p:spTree>
@@ -25934,228 +25289,7 @@
 </p:sld>
 </file>
 
-<file path=ppt/slides/slide4.xml><?xml version="1.0" encoding="utf-8"?>
-<p:sld xmlns:a="http://schemas.openxmlformats.org/drawingml/2006/main" xmlns:r="http://schemas.openxmlformats.org/officeDocument/2006/relationships" xmlns:p="http://schemas.openxmlformats.org/presentationml/2006/main" showMasterPhAnim="0">
-  <p:cSld>
-    <p:spTree>
-      <p:nvGrpSpPr>
-        <p:cNvPr id="1" name=""/>
-        <p:cNvGrpSpPr/>
-        <p:nvPr/>
-      </p:nvGrpSpPr>
-      <p:grpSpPr>
-        <a:xfrm>
-          <a:off x="0" y="0"/>
-          <a:ext cx="0" cy="0"/>
-          <a:chOff x="0" y="0"/>
-          <a:chExt cx="0" cy="0"/>
-        </a:xfrm>
-      </p:grpSpPr>
-      <p:sp>
-        <p:nvSpPr>
-          <p:cNvPr id="473090" name="Rectangle 2"/>
-          <p:cNvSpPr>
-            <a:spLocks noGrp="1" noChangeArrowheads="1"/>
-          </p:cNvSpPr>
-          <p:nvPr>
-            <p:ph type="title"/>
-          </p:nvPr>
-        </p:nvSpPr>
-        <p:spPr/>
-        <p:txBody>
-          <a:bodyPr/>
-          <a:lstStyle/>
-          <a:p>
-            <a:r>
-              <a:rPr lang="en-US" sz="3600" dirty="0" smtClean="0"/>
-              <a:t>HTTP</a:t>
-            </a:r>
-            <a:endParaRPr lang="en-US" sz="3600" dirty="0"/>
-          </a:p>
-        </p:txBody>
-      </p:sp>
-      <p:sp>
-        <p:nvSpPr>
-          <p:cNvPr id="473091" name="Rectangle 3"/>
-          <p:cNvSpPr>
-            <a:spLocks noGrp="1" noChangeArrowheads="1"/>
-          </p:cNvSpPr>
-          <p:nvPr>
-            <p:ph idx="1"/>
-          </p:nvPr>
-        </p:nvSpPr>
-        <p:spPr/>
-        <p:txBody>
-          <a:bodyPr/>
-          <a:lstStyle/>
-          <a:p>
-            <a:pPr>
-              <a:lnSpc>
-                <a:spcPct val="100000"/>
-              </a:lnSpc>
-            </a:pPr>
-            <a:r>
-              <a:rPr lang="en-US" dirty="0">
-                <a:solidFill>
-                  <a:schemeClr val="accent5">
-                    <a:lumMod val="20000"/>
-                    <a:lumOff val="80000"/>
-                  </a:schemeClr>
-                </a:solidFill>
-              </a:rPr>
-              <a:t>Hyper Text Transfer Protocol (HTTP)</a:t>
-            </a:r>
-          </a:p>
-          <a:p>
-            <a:pPr lvl="1">
-              <a:lnSpc>
-                <a:spcPct val="100000"/>
-              </a:lnSpc>
-            </a:pPr>
-            <a:r>
-              <a:rPr lang="en-US" dirty="0"/>
-              <a:t>Client-server protocol for transferring Web </a:t>
-            </a:r>
-            <a:r>
-              <a:rPr lang="en-US" dirty="0" smtClean="0"/>
-              <a:t>resources (HTML files, images, styles, etc.)</a:t>
-            </a:r>
-            <a:endParaRPr lang="en-US" dirty="0"/>
-          </a:p>
-          <a:p>
-            <a:pPr>
-              <a:lnSpc>
-                <a:spcPct val="100000"/>
-              </a:lnSpc>
-            </a:pPr>
-            <a:r>
-              <a:rPr lang="en-US" dirty="0"/>
-              <a:t>Important properties of HTTP</a:t>
-            </a:r>
-          </a:p>
-          <a:p>
-            <a:pPr lvl="1">
-              <a:lnSpc>
-                <a:spcPct val="100000"/>
-              </a:lnSpc>
-            </a:pPr>
-            <a:r>
-              <a:rPr lang="en-US" dirty="0"/>
-              <a:t>Request-response </a:t>
-            </a:r>
-            <a:r>
-              <a:rPr lang="en-US" dirty="0" smtClean="0"/>
-              <a:t>model</a:t>
-            </a:r>
-            <a:endParaRPr lang="en-US" dirty="0"/>
-          </a:p>
-          <a:p>
-            <a:pPr lvl="1">
-              <a:lnSpc>
-                <a:spcPct val="100000"/>
-              </a:lnSpc>
-            </a:pPr>
-            <a:r>
-              <a:rPr lang="en-US" dirty="0"/>
-              <a:t>Text-based format</a:t>
-            </a:r>
-          </a:p>
-          <a:p>
-            <a:pPr lvl="1">
-              <a:lnSpc>
-                <a:spcPct val="100000"/>
-              </a:lnSpc>
-            </a:pPr>
-            <a:r>
-              <a:rPr lang="en-US" dirty="0" smtClean="0"/>
-              <a:t>Relies </a:t>
-            </a:r>
-            <a:r>
-              <a:rPr lang="en-US" dirty="0"/>
-              <a:t>on a </a:t>
-            </a:r>
-            <a:r>
-              <a:rPr lang="en-US" dirty="0" smtClean="0"/>
-              <a:t>unique resource URLs</a:t>
-            </a:r>
-            <a:endParaRPr lang="en-US" dirty="0"/>
-          </a:p>
-          <a:p>
-            <a:pPr lvl="1">
-              <a:lnSpc>
-                <a:spcPct val="100000"/>
-              </a:lnSpc>
-            </a:pPr>
-            <a:r>
-              <a:rPr lang="en-US" dirty="0" smtClean="0"/>
-              <a:t>Provides resource metadata (e.g. encoding)</a:t>
-            </a:r>
-            <a:endParaRPr lang="en-US" dirty="0"/>
-          </a:p>
-          <a:p>
-            <a:pPr lvl="1">
-              <a:lnSpc>
-                <a:spcPct val="100000"/>
-              </a:lnSpc>
-            </a:pPr>
-            <a:r>
-              <a:rPr lang="en-US" dirty="0" smtClean="0"/>
-              <a:t>Stateless (cookies can overcome this)</a:t>
-            </a:r>
-            <a:endParaRPr lang="en-US" dirty="0"/>
-          </a:p>
-        </p:txBody>
-      </p:sp>
-      <p:sp>
-        <p:nvSpPr>
-          <p:cNvPr id="4" name="Slide Number Placeholder 3"/>
-          <p:cNvSpPr>
-            <a:spLocks noGrp="1"/>
-          </p:cNvSpPr>
-          <p:nvPr>
-            <p:ph type="sldNum" sz="quarter" idx="10"/>
-          </p:nvPr>
-        </p:nvSpPr>
-        <p:spPr/>
-        <p:txBody>
-          <a:bodyPr/>
-          <a:lstStyle/>
-          <a:p>
-            <a:pPr>
-              <a:defRPr/>
-            </a:pPr>
-            <a:fld id="{58452FF4-89E3-4D1B-9927-2DBDC00E58D7}" type="slidenum">
-              <a:rPr lang="en-US" smtClean="0"/>
-              <a:pPr>
-                <a:defRPr/>
-              </a:pPr>
-              <a:t>4</a:t>
-            </a:fld>
-            <a:endParaRPr lang="en-US" dirty="0"/>
-          </a:p>
-        </p:txBody>
-      </p:sp>
-    </p:spTree>
-    <p:extLst>
-      <p:ext uri="{BB962C8B-B14F-4D97-AF65-F5344CB8AC3E}">
-        <p14:creationId xmlns:p14="http://schemas.microsoft.com/office/powerpoint/2010/main" val="2440486903"/>
-      </p:ext>
-    </p:extLst>
-  </p:cSld>
-  <p:clrMapOvr>
-    <a:masterClrMapping/>
-  </p:clrMapOvr>
-  <p:timing>
-    <p:tnLst>
-      <p:par>
-        <p:cTn id="1" dur="indefinite" restart="never" nodeType="tmRoot"/>
-      </p:par>
-    </p:tnLst>
-  </p:timing>
-</p:sld>
-</file>
-
-<file path=ppt/slides/slide40.xml><?xml version="1.0" encoding="utf-8"?>
+<file path=ppt/slides/slide38.xml><?xml version="1.0" encoding="utf-8"?>
 <p:sld xmlns:a="http://schemas.openxmlformats.org/drawingml/2006/main" xmlns:r="http://schemas.openxmlformats.org/officeDocument/2006/relationships" xmlns:p="http://schemas.openxmlformats.org/presentationml/2006/main">
   <p:cSld>
     <p:spTree>
@@ -26301,7 +25435,7 @@
 </p:sld>
 </file>
 
-<file path=ppt/slides/slide41.xml><?xml version="1.0" encoding="utf-8"?>
+<file path=ppt/slides/slide39.xml><?xml version="1.0" encoding="utf-8"?>
 <p:sld xmlns:a="http://schemas.openxmlformats.org/drawingml/2006/main" xmlns:r="http://schemas.openxmlformats.org/officeDocument/2006/relationships" xmlns:p="http://schemas.openxmlformats.org/presentationml/2006/main">
   <p:cSld>
     <p:spTree>
@@ -26450,7 +25584,7 @@
               <a:pPr>
                 <a:defRPr/>
               </a:pPr>
-              <a:t>41</a:t>
+              <a:t>39</a:t>
             </a:fld>
             <a:endParaRPr lang="en-US" dirty="0"/>
           </a:p>
@@ -26550,7 +25684,228 @@
 </p:sld>
 </file>
 
-<file path=ppt/slides/slide42.xml><?xml version="1.0" encoding="utf-8"?>
+<file path=ppt/slides/slide4.xml><?xml version="1.0" encoding="utf-8"?>
+<p:sld xmlns:a="http://schemas.openxmlformats.org/drawingml/2006/main" xmlns:r="http://schemas.openxmlformats.org/officeDocument/2006/relationships" xmlns:p="http://schemas.openxmlformats.org/presentationml/2006/main" showMasterPhAnim="0">
+  <p:cSld>
+    <p:spTree>
+      <p:nvGrpSpPr>
+        <p:cNvPr id="1" name=""/>
+        <p:cNvGrpSpPr/>
+        <p:nvPr/>
+      </p:nvGrpSpPr>
+      <p:grpSpPr>
+        <a:xfrm>
+          <a:off x="0" y="0"/>
+          <a:ext cx="0" cy="0"/>
+          <a:chOff x="0" y="0"/>
+          <a:chExt cx="0" cy="0"/>
+        </a:xfrm>
+      </p:grpSpPr>
+      <p:sp>
+        <p:nvSpPr>
+          <p:cNvPr id="473090" name="Rectangle 2"/>
+          <p:cNvSpPr>
+            <a:spLocks noGrp="1" noChangeArrowheads="1"/>
+          </p:cNvSpPr>
+          <p:nvPr>
+            <p:ph type="title"/>
+          </p:nvPr>
+        </p:nvSpPr>
+        <p:spPr/>
+        <p:txBody>
+          <a:bodyPr/>
+          <a:lstStyle/>
+          <a:p>
+            <a:r>
+              <a:rPr lang="en-US" sz="3600" dirty="0" smtClean="0"/>
+              <a:t>HTTP</a:t>
+            </a:r>
+            <a:endParaRPr lang="en-US" sz="3600" dirty="0"/>
+          </a:p>
+        </p:txBody>
+      </p:sp>
+      <p:sp>
+        <p:nvSpPr>
+          <p:cNvPr id="473091" name="Rectangle 3"/>
+          <p:cNvSpPr>
+            <a:spLocks noGrp="1" noChangeArrowheads="1"/>
+          </p:cNvSpPr>
+          <p:nvPr>
+            <p:ph idx="1"/>
+          </p:nvPr>
+        </p:nvSpPr>
+        <p:spPr/>
+        <p:txBody>
+          <a:bodyPr/>
+          <a:lstStyle/>
+          <a:p>
+            <a:pPr>
+              <a:lnSpc>
+                <a:spcPct val="100000"/>
+              </a:lnSpc>
+            </a:pPr>
+            <a:r>
+              <a:rPr lang="en-US" dirty="0">
+                <a:solidFill>
+                  <a:schemeClr val="accent5">
+                    <a:lumMod val="20000"/>
+                    <a:lumOff val="80000"/>
+                  </a:schemeClr>
+                </a:solidFill>
+              </a:rPr>
+              <a:t>Hyper Text Transfer Protocol (HTTP)</a:t>
+            </a:r>
+          </a:p>
+          <a:p>
+            <a:pPr lvl="1">
+              <a:lnSpc>
+                <a:spcPct val="100000"/>
+              </a:lnSpc>
+            </a:pPr>
+            <a:r>
+              <a:rPr lang="en-US" dirty="0"/>
+              <a:t>Client-server protocol for transferring Web </a:t>
+            </a:r>
+            <a:r>
+              <a:rPr lang="en-US" dirty="0" smtClean="0"/>
+              <a:t>resources (HTML files, images, styles, etc.)</a:t>
+            </a:r>
+            <a:endParaRPr lang="en-US" dirty="0"/>
+          </a:p>
+          <a:p>
+            <a:pPr>
+              <a:lnSpc>
+                <a:spcPct val="100000"/>
+              </a:lnSpc>
+            </a:pPr>
+            <a:r>
+              <a:rPr lang="en-US" dirty="0"/>
+              <a:t>Important properties of HTTP</a:t>
+            </a:r>
+          </a:p>
+          <a:p>
+            <a:pPr lvl="1">
+              <a:lnSpc>
+                <a:spcPct val="100000"/>
+              </a:lnSpc>
+            </a:pPr>
+            <a:r>
+              <a:rPr lang="en-US" dirty="0"/>
+              <a:t>Request-response </a:t>
+            </a:r>
+            <a:r>
+              <a:rPr lang="en-US" dirty="0" smtClean="0"/>
+              <a:t>model</a:t>
+            </a:r>
+            <a:endParaRPr lang="en-US" dirty="0"/>
+          </a:p>
+          <a:p>
+            <a:pPr lvl="1">
+              <a:lnSpc>
+                <a:spcPct val="100000"/>
+              </a:lnSpc>
+            </a:pPr>
+            <a:r>
+              <a:rPr lang="en-US" dirty="0"/>
+              <a:t>Text-based format</a:t>
+            </a:r>
+          </a:p>
+          <a:p>
+            <a:pPr lvl="1">
+              <a:lnSpc>
+                <a:spcPct val="100000"/>
+              </a:lnSpc>
+            </a:pPr>
+            <a:r>
+              <a:rPr lang="en-US" dirty="0" smtClean="0"/>
+              <a:t>Relies </a:t>
+            </a:r>
+            <a:r>
+              <a:rPr lang="en-US" dirty="0"/>
+              <a:t>on a </a:t>
+            </a:r>
+            <a:r>
+              <a:rPr lang="en-US" dirty="0" smtClean="0"/>
+              <a:t>unique resource URLs</a:t>
+            </a:r>
+            <a:endParaRPr lang="en-US" dirty="0"/>
+          </a:p>
+          <a:p>
+            <a:pPr lvl="1">
+              <a:lnSpc>
+                <a:spcPct val="100000"/>
+              </a:lnSpc>
+            </a:pPr>
+            <a:r>
+              <a:rPr lang="en-US" dirty="0" smtClean="0"/>
+              <a:t>Provides resource metadata (e.g. encoding)</a:t>
+            </a:r>
+            <a:endParaRPr lang="en-US" dirty="0"/>
+          </a:p>
+          <a:p>
+            <a:pPr lvl="1">
+              <a:lnSpc>
+                <a:spcPct val="100000"/>
+              </a:lnSpc>
+            </a:pPr>
+            <a:r>
+              <a:rPr lang="en-US" dirty="0" smtClean="0"/>
+              <a:t>Stateless (cookies can overcome this)</a:t>
+            </a:r>
+            <a:endParaRPr lang="en-US" dirty="0"/>
+          </a:p>
+        </p:txBody>
+      </p:sp>
+      <p:sp>
+        <p:nvSpPr>
+          <p:cNvPr id="4" name="Slide Number Placeholder 3"/>
+          <p:cNvSpPr>
+            <a:spLocks noGrp="1"/>
+          </p:cNvSpPr>
+          <p:nvPr>
+            <p:ph type="sldNum" sz="quarter" idx="10"/>
+          </p:nvPr>
+        </p:nvSpPr>
+        <p:spPr/>
+        <p:txBody>
+          <a:bodyPr/>
+          <a:lstStyle/>
+          <a:p>
+            <a:pPr>
+              <a:defRPr/>
+            </a:pPr>
+            <a:fld id="{58452FF4-89E3-4D1B-9927-2DBDC00E58D7}" type="slidenum">
+              <a:rPr lang="en-US" smtClean="0"/>
+              <a:pPr>
+                <a:defRPr/>
+              </a:pPr>
+              <a:t>4</a:t>
+            </a:fld>
+            <a:endParaRPr lang="en-US" dirty="0"/>
+          </a:p>
+        </p:txBody>
+      </p:sp>
+    </p:spTree>
+    <p:extLst>
+      <p:ext uri="{BB962C8B-B14F-4D97-AF65-F5344CB8AC3E}">
+        <p14:creationId xmlns:p14="http://schemas.microsoft.com/office/powerpoint/2010/main" val="2440486903"/>
+      </p:ext>
+    </p:extLst>
+  </p:cSld>
+  <p:clrMapOvr>
+    <a:masterClrMapping/>
+  </p:clrMapOvr>
+  <p:timing>
+    <p:tnLst>
+      <p:par>
+        <p:cTn id="1" dur="indefinite" restart="never" nodeType="tmRoot"/>
+      </p:par>
+    </p:tnLst>
+  </p:timing>
+</p:sld>
+</file>
+
+<file path=ppt/slides/slide40.xml><?xml version="1.0" encoding="utf-8"?>
 <p:sld xmlns:a="http://schemas.openxmlformats.org/drawingml/2006/main" xmlns:r="http://schemas.openxmlformats.org/officeDocument/2006/relationships" xmlns:p="http://schemas.openxmlformats.org/presentationml/2006/main">
   <p:cSld>
     <p:spTree>
@@ -26691,7 +26046,7 @@
               <a:pPr>
                 <a:defRPr/>
               </a:pPr>
-              <a:t>42</a:t>
+              <a:t>40</a:t>
             </a:fld>
             <a:endParaRPr lang="en-US" dirty="0"/>
           </a:p>
@@ -26741,7 +26096,7 @@
 </p:sld>
 </file>
 
-<file path=ppt/slides/slide43.xml><?xml version="1.0" encoding="utf-8"?>
+<file path=ppt/slides/slide41.xml><?xml version="1.0" encoding="utf-8"?>
 <p:sld xmlns:a="http://schemas.openxmlformats.org/drawingml/2006/main" xmlns:r="http://schemas.openxmlformats.org/officeDocument/2006/relationships" xmlns:p="http://schemas.openxmlformats.org/presentationml/2006/main">
   <p:cSld>
     <p:spTree>
@@ -26875,7 +26230,7 @@
 </p:sld>
 </file>
 
-<file path=ppt/slides/slide44.xml><?xml version="1.0" encoding="utf-8"?>
+<file path=ppt/slides/slide42.xml><?xml version="1.0" encoding="utf-8"?>
 <p:sld xmlns:a="http://schemas.openxmlformats.org/drawingml/2006/main" xmlns:r="http://schemas.openxmlformats.org/officeDocument/2006/relationships" xmlns:p="http://schemas.openxmlformats.org/presentationml/2006/main">
   <p:cSld>
     <p:spTree>
@@ -27093,7 +26448,7 @@
 </p:sld>
 </file>
 
-<file path=ppt/slides/slide45.xml><?xml version="1.0" encoding="utf-8"?>
+<file path=ppt/slides/slide43.xml><?xml version="1.0" encoding="utf-8"?>
 <p:sld xmlns:a="http://schemas.openxmlformats.org/drawingml/2006/main" xmlns:r="http://schemas.openxmlformats.org/officeDocument/2006/relationships" xmlns:p="http://schemas.openxmlformats.org/presentationml/2006/main">
   <p:cSld>
     <p:spTree>
@@ -27240,7 +26595,7 @@
               <a:pPr>
                 <a:defRPr/>
               </a:pPr>
-              <a:t>45</a:t>
+              <a:t>43</a:t>
             </a:fld>
             <a:endParaRPr lang="en-US" dirty="0"/>
           </a:p>
@@ -27290,7 +26645,7 @@
 </p:sld>
 </file>
 
-<file path=ppt/slides/slide46.xml><?xml version="1.0" encoding="utf-8"?>
+<file path=ppt/slides/slide44.xml><?xml version="1.0" encoding="utf-8"?>
 <p:sld xmlns:a="http://schemas.openxmlformats.org/drawingml/2006/main" xmlns:r="http://schemas.openxmlformats.org/officeDocument/2006/relationships" xmlns:p="http://schemas.openxmlformats.org/presentationml/2006/main">
   <p:cSld>
     <p:spTree>
@@ -27399,13 +26754,7 @@
               <a:rPr lang="en-US" dirty="0" smtClean="0">
                 <a:hlinkClick r:id="rId2"/>
               </a:rPr>
-              <a:t>http://</a:t>
-            </a:r>
-            <a:r>
-              <a:rPr lang="en-US" dirty="0" smtClean="0">
-                <a:hlinkClick r:id="rId2"/>
-              </a:rPr>
-              <a:t>localhost:port/Glimpse.axd</a:t>
+              <a:t>http://localhost:port/Glimpse.axd</a:t>
             </a:r>
             <a:endParaRPr lang="en-US" i="1" dirty="0" smtClean="0"/>
           </a:p>
@@ -27434,7 +26783,7 @@
               <a:pPr>
                 <a:defRPr/>
               </a:pPr>
-              <a:t>46</a:t>
+              <a:t>44</a:t>
             </a:fld>
             <a:endParaRPr lang="en-US" dirty="0"/>
           </a:p>
@@ -27510,7 +26859,7 @@
 </p:sld>
 </file>
 
-<file path=ppt/slides/slide47.xml><?xml version="1.0" encoding="utf-8"?>
+<file path=ppt/slides/slide45.xml><?xml version="1.0" encoding="utf-8"?>
 <p:sld xmlns:a="http://schemas.openxmlformats.org/drawingml/2006/main" xmlns:r="http://schemas.openxmlformats.org/officeDocument/2006/relationships" xmlns:p="http://schemas.openxmlformats.org/presentationml/2006/main">
   <p:cSld>
     <p:bg>
@@ -27642,7 +26991,7 @@
               <a:pPr>
                 <a:defRPr/>
               </a:pPr>
-              <a:t>47</a:t>
+              <a:t>45</a:t>
             </a:fld>
             <a:endParaRPr lang="en-US" dirty="0"/>
           </a:p>
@@ -27987,7 +27336,7 @@
 </p:sld>
 </file>
 
-<file path=ppt/slides/slide48.xml><?xml version="1.0" encoding="utf-8"?>
+<file path=ppt/slides/slide46.xml><?xml version="1.0" encoding="utf-8"?>
 <p:sld xmlns:a="http://schemas.openxmlformats.org/drawingml/2006/main" xmlns:r="http://schemas.openxmlformats.org/officeDocument/2006/relationships" xmlns:p="http://schemas.openxmlformats.org/presentationml/2006/main">
   <p:cSld>
     <p:spTree>
@@ -28093,7 +27442,7 @@
 </p:sld>
 </file>
 
-<file path=ppt/slides/slide49.xml><?xml version="1.0" encoding="utf-8"?>
+<file path=ppt/slides/slide47.xml><?xml version="1.0" encoding="utf-8"?>
 <p:sld xmlns:a="http://schemas.openxmlformats.org/drawingml/2006/main" xmlns:r="http://schemas.openxmlformats.org/officeDocument/2006/relationships" xmlns:p="http://schemas.openxmlformats.org/presentationml/2006/main">
   <p:cSld>
     <p:spTree>
@@ -28267,7 +27616,7 @@
               <a:pPr>
                 <a:defRPr/>
               </a:pPr>
-              <a:t>49</a:t>
+              <a:t>47</a:t>
             </a:fld>
             <a:endParaRPr lang="en-US" dirty="0"/>
           </a:p>
@@ -28277,6 +27626,595 @@
     <p:extLst>
       <p:ext uri="{BB962C8B-B14F-4D97-AF65-F5344CB8AC3E}">
         <p14:creationId xmlns:p14="http://schemas.microsoft.com/office/powerpoint/2010/main" val="1229180615"/>
+      </p:ext>
+    </p:extLst>
+  </p:cSld>
+  <p:clrMapOvr>
+    <a:masterClrMapping/>
+  </p:clrMapOvr>
+  <p:timing>
+    <p:tnLst>
+      <p:par>
+        <p:cTn id="1" dur="indefinite" restart="never" nodeType="tmRoot"/>
+      </p:par>
+    </p:tnLst>
+  </p:timing>
+</p:sld>
+</file>
+
+<file path=ppt/slides/slide48.xml><?xml version="1.0" encoding="utf-8"?>
+<p:sld xmlns:a="http://schemas.openxmlformats.org/drawingml/2006/main" xmlns:r="http://schemas.openxmlformats.org/officeDocument/2006/relationships" xmlns:p="http://schemas.openxmlformats.org/presentationml/2006/main">
+  <p:cSld>
+    <p:spTree>
+      <p:nvGrpSpPr>
+        <p:cNvPr id="1" name=""/>
+        <p:cNvGrpSpPr/>
+        <p:nvPr/>
+      </p:nvGrpSpPr>
+      <p:grpSpPr>
+        <a:xfrm>
+          <a:off x="0" y="0"/>
+          <a:ext cx="0" cy="0"/>
+          <a:chOff x="0" y="0"/>
+          <a:chExt cx="0" cy="0"/>
+        </a:xfrm>
+      </p:grpSpPr>
+      <p:sp>
+        <p:nvSpPr>
+          <p:cNvPr id="2" name="Title 1"/>
+          <p:cNvSpPr>
+            <a:spLocks noGrp="1"/>
+          </p:cNvSpPr>
+          <p:nvPr>
+            <p:ph type="title"/>
+          </p:nvPr>
+        </p:nvSpPr>
+        <p:spPr/>
+        <p:txBody>
+          <a:bodyPr/>
+          <a:lstStyle/>
+          <a:p>
+            <a:r>
+              <a:rPr lang="en-US" dirty="0"/>
+              <a:t>Introduction to ASP.NET </a:t>
+            </a:r>
+            <a:r>
+              <a:rPr lang="en-US" dirty="0" smtClean="0"/>
+              <a:t>MVC</a:t>
+            </a:r>
+            <a:endParaRPr lang="en-US" dirty="0"/>
+          </a:p>
+        </p:txBody>
+      </p:sp>
+      <p:sp>
+        <p:nvSpPr>
+          <p:cNvPr id="3" name="Text Placeholder 2"/>
+          <p:cNvSpPr>
+            <a:spLocks noGrp="1"/>
+          </p:cNvSpPr>
+          <p:nvPr>
+            <p:ph type="body" sz="quarter" idx="10"/>
+          </p:nvPr>
+        </p:nvSpPr>
+        <p:spPr>
+          <a:xfrm>
+            <a:off x="6115980" y="6400800"/>
+            <a:ext cx="2909707" cy="369332"/>
+          </a:xfrm>
+        </p:spPr>
+        <p:txBody>
+          <a:bodyPr/>
+          <a:lstStyle/>
+          <a:p>
+            <a:r>
+              <a:rPr lang="en-US" dirty="0">
+                <a:hlinkClick r:id="rId2"/>
+              </a:rPr>
+              <a:t>http</a:t>
+            </a:r>
+            <a:r>
+              <a:rPr lang="en-US" dirty="0" smtClean="0">
+                <a:hlinkClick r:id="rId2"/>
+              </a:rPr>
+              <a:t>://academy.telerik.com</a:t>
+            </a:r>
+            <a:endParaRPr lang="en-US" dirty="0"/>
+          </a:p>
+        </p:txBody>
+      </p:sp>
+    </p:spTree>
+    <p:extLst>
+      <p:ext uri="{BB962C8B-B14F-4D97-AF65-F5344CB8AC3E}">
+        <p14:creationId xmlns:p14="http://schemas.microsoft.com/office/powerpoint/2010/main" val="3133162700"/>
+      </p:ext>
+    </p:extLst>
+  </p:cSld>
+  <p:clrMapOvr>
+    <a:masterClrMapping/>
+  </p:clrMapOvr>
+  <p:timing>
+    <p:tnLst>
+      <p:par>
+        <p:cTn id="1" dur="indefinite" restart="never" nodeType="tmRoot"/>
+      </p:par>
+    </p:tnLst>
+  </p:timing>
+</p:sld>
+</file>
+
+<file path=ppt/slides/slide49.xml><?xml version="1.0" encoding="utf-8"?>
+<p:sld xmlns:a="http://schemas.openxmlformats.org/drawingml/2006/main" xmlns:r="http://schemas.openxmlformats.org/officeDocument/2006/relationships" xmlns:p="http://schemas.openxmlformats.org/presentationml/2006/main">
+  <p:cSld>
+    <p:spTree>
+      <p:nvGrpSpPr>
+        <p:cNvPr id="1" name=""/>
+        <p:cNvGrpSpPr/>
+        <p:nvPr/>
+      </p:nvGrpSpPr>
+      <p:grpSpPr>
+        <a:xfrm>
+          <a:off x="0" y="0"/>
+          <a:ext cx="0" cy="0"/>
+          <a:chOff x="0" y="0"/>
+          <a:chExt cx="0" cy="0"/>
+        </a:xfrm>
+      </p:grpSpPr>
+      <p:sp>
+        <p:nvSpPr>
+          <p:cNvPr id="3" name="Title 2"/>
+          <p:cNvSpPr>
+            <a:spLocks noGrp="1"/>
+          </p:cNvSpPr>
+          <p:nvPr>
+            <p:ph type="title"/>
+          </p:nvPr>
+        </p:nvSpPr>
+        <p:spPr/>
+        <p:txBody>
+          <a:bodyPr/>
+          <a:lstStyle/>
+          <a:p>
+            <a:r>
+              <a:rPr lang="en-US" sz="3600" dirty="0" smtClean="0"/>
+              <a:t>Free Trainings @ Telerik Academy</a:t>
+            </a:r>
+            <a:endParaRPr lang="en-US" sz="3600" dirty="0"/>
+          </a:p>
+        </p:txBody>
+      </p:sp>
+      <p:sp>
+        <p:nvSpPr>
+          <p:cNvPr id="4" name="Content Placeholder 3"/>
+          <p:cNvSpPr>
+            <a:spLocks noGrp="1"/>
+          </p:cNvSpPr>
+          <p:nvPr>
+            <p:ph idx="1"/>
+          </p:nvPr>
+        </p:nvSpPr>
+        <p:spPr>
+          <a:xfrm>
+            <a:off x="228600" y="1066800"/>
+            <a:ext cx="8686800" cy="5638800"/>
+          </a:xfrm>
+        </p:spPr>
+        <p:txBody>
+          <a:bodyPr/>
+          <a:lstStyle/>
+          <a:p>
+            <a:r>
+              <a:rPr lang="en-US" dirty="0" smtClean="0"/>
+              <a:t>“C# Programming @ Telerik Academy</a:t>
+            </a:r>
+          </a:p>
+          <a:p>
+            <a:pPr marL="574675" lvl="2" indent="-282575">
+              <a:buClr>
+                <a:schemeClr val="accent5">
+                  <a:lumMod val="40000"/>
+                  <a:lumOff val="60000"/>
+                </a:schemeClr>
+              </a:buClr>
+              <a:buSzPct val="70000"/>
+              <a:buFont typeface="Wingdings 2" pitchFamily="18" charset="2"/>
+              <a:buChar char=""/>
+              <a:tabLst>
+                <a:tab pos="282575" algn="l"/>
+              </a:tabLst>
+            </a:pPr>
+            <a:r>
+              <a:rPr lang="en-US" noProof="1">
+                <a:hlinkClick r:id="rId2"/>
+              </a:rPr>
+              <a:t>csharpfundamentals.telerik.com</a:t>
+            </a:r>
+            <a:endParaRPr lang="en-US" noProof="1"/>
+          </a:p>
+          <a:p>
+            <a:pPr marL="282575" lvl="1" indent="-282575">
+              <a:spcBef>
+                <a:spcPts val="1800"/>
+              </a:spcBef>
+              <a:buClr>
+                <a:schemeClr val="accent5">
+                  <a:lumMod val="40000"/>
+                  <a:lumOff val="60000"/>
+                </a:schemeClr>
+              </a:buClr>
+              <a:buSzPct val="70000"/>
+              <a:buFont typeface="Wingdings 2" pitchFamily="18" charset="2"/>
+              <a:buChar char=""/>
+              <a:tabLst>
+                <a:tab pos="282575" algn="l"/>
+              </a:tabLst>
+            </a:pPr>
+            <a:r>
+              <a:rPr lang="en-US" dirty="0" smtClean="0"/>
+              <a:t>Telerik Software Academy</a:t>
+            </a:r>
+          </a:p>
+          <a:p>
+            <a:pPr marL="574675" lvl="2" indent="-282575">
+              <a:buClr>
+                <a:schemeClr val="accent5">
+                  <a:lumMod val="40000"/>
+                  <a:lumOff val="60000"/>
+                </a:schemeClr>
+              </a:buClr>
+              <a:buSzPct val="70000"/>
+              <a:buFont typeface="Wingdings 2" pitchFamily="18" charset="2"/>
+              <a:buChar char=""/>
+              <a:tabLst>
+                <a:tab pos="282575" algn="l"/>
+              </a:tabLst>
+            </a:pPr>
+            <a:r>
+              <a:rPr lang="en-US" noProof="1" smtClean="0">
+                <a:hlinkClick r:id="rId3" tooltip="Telerik Software Academy - Free Programming Courses"/>
+              </a:rPr>
+              <a:t>academy.telerik.com</a:t>
+            </a:r>
+            <a:endParaRPr lang="en-US" noProof="1" smtClean="0"/>
+          </a:p>
+          <a:p>
+            <a:pPr marL="282575" lvl="1" indent="-282575">
+              <a:spcBef>
+                <a:spcPts val="1800"/>
+              </a:spcBef>
+              <a:buClr>
+                <a:schemeClr val="accent5">
+                  <a:lumMod val="40000"/>
+                  <a:lumOff val="60000"/>
+                </a:schemeClr>
+              </a:buClr>
+              <a:buSzPct val="70000"/>
+              <a:buFont typeface="Wingdings 2" pitchFamily="18" charset="2"/>
+              <a:buChar char=""/>
+              <a:tabLst>
+                <a:tab pos="282575" algn="l"/>
+              </a:tabLst>
+            </a:pPr>
+            <a:r>
+              <a:rPr lang="en-US" dirty="0" smtClean="0"/>
+              <a:t>Telerik Academy @ Facebook</a:t>
+            </a:r>
+          </a:p>
+          <a:p>
+            <a:pPr marL="574675" lvl="2" indent="-282575">
+              <a:buClr>
+                <a:schemeClr val="accent5">
+                  <a:lumMod val="40000"/>
+                  <a:lumOff val="60000"/>
+                </a:schemeClr>
+              </a:buClr>
+              <a:buSzPct val="70000"/>
+              <a:buFont typeface="Wingdings 2" pitchFamily="18" charset="2"/>
+              <a:buChar char=""/>
+              <a:tabLst>
+                <a:tab pos="282575" algn="l"/>
+              </a:tabLst>
+            </a:pPr>
+            <a:r>
+              <a:rPr lang="en-US" noProof="1" smtClean="0">
+                <a:hlinkClick r:id="rId4" tooltip="Telerik Softyware Academy @ Facebook"/>
+              </a:rPr>
+              <a:t>facebook.com/TelerikAcademy</a:t>
+            </a:r>
+            <a:endParaRPr lang="en-US" noProof="1" smtClean="0"/>
+          </a:p>
+          <a:p>
+            <a:pPr marL="282575" lvl="1" indent="-282575">
+              <a:spcBef>
+                <a:spcPts val="1800"/>
+              </a:spcBef>
+              <a:buClr>
+                <a:schemeClr val="accent5">
+                  <a:lumMod val="40000"/>
+                  <a:lumOff val="60000"/>
+                </a:schemeClr>
+              </a:buClr>
+              <a:buSzPct val="70000"/>
+              <a:buFont typeface="Wingdings 2" pitchFamily="18" charset="2"/>
+              <a:buChar char=""/>
+              <a:tabLst>
+                <a:tab pos="282575" algn="l"/>
+              </a:tabLst>
+            </a:pPr>
+            <a:r>
+              <a:rPr lang="en-US" dirty="0" smtClean="0"/>
+              <a:t>Telerik Software Academy Forums</a:t>
+            </a:r>
+          </a:p>
+          <a:p>
+            <a:pPr marL="574675" lvl="2" indent="-282575">
+              <a:buClr>
+                <a:schemeClr val="accent5">
+                  <a:lumMod val="40000"/>
+                  <a:lumOff val="60000"/>
+                </a:schemeClr>
+              </a:buClr>
+              <a:buSzPct val="70000"/>
+              <a:buFont typeface="Wingdings 2" pitchFamily="18" charset="2"/>
+              <a:buChar char=""/>
+              <a:tabLst>
+                <a:tab pos="282575" algn="l"/>
+              </a:tabLst>
+            </a:pPr>
+            <a:r>
+              <a:rPr lang="en-US" noProof="1" smtClean="0">
+                <a:hlinkClick r:id="rId5" tooltip="Telerik Software Academy Forums - Community for Programmers"/>
+              </a:rPr>
+              <a:t>forums.academy.telerik.com</a:t>
+            </a:r>
+            <a:endParaRPr lang="en-US" noProof="1"/>
+          </a:p>
+        </p:txBody>
+      </p:sp>
+      <p:pic>
+        <p:nvPicPr>
+          <p:cNvPr id="5" name="Picture 5">
+            <a:hlinkClick r:id="rId5" tooltip="Telerik Software Academy Forums - Discussion Board for Developers"/>
+          </p:cNvPr>
+          <p:cNvPicPr>
+            <a:picLocks noChangeAspect="1" noChangeArrowheads="1"/>
+          </p:cNvPicPr>
+          <p:nvPr/>
+        </p:nvPicPr>
+        <p:blipFill>
+          <a:blip r:embed="rId6">
+            <a:extLst>
+              <a:ext uri="{28A0092B-C50C-407E-A947-70E740481C1C}">
+                <a14:useLocalDpi xmlns:a14="http://schemas.microsoft.com/office/drawing/2010/main" val="0"/>
+              </a:ext>
+            </a:extLst>
+          </a:blip>
+          <a:srcRect/>
+          <a:stretch>
+            <a:fillRect/>
+          </a:stretch>
+        </p:blipFill>
+        <p:spPr bwMode="auto">
+          <a:xfrm>
+            <a:off x="7523898" y="5218092"/>
+            <a:ext cx="1162902" cy="1268619"/>
+          </a:xfrm>
+          <a:prstGeom prst="rect">
+            <a:avLst/>
+          </a:prstGeom>
+          <a:noFill/>
+          <a:ln>
+            <a:noFill/>
+          </a:ln>
+          <a:effectLst/>
+          <a:extLst>
+            <a:ext uri="{909E8E84-426E-40DD-AFC4-6F175D3DCCD1}">
+              <a14:hiddenFill xmlns:a14="http://schemas.microsoft.com/office/drawing/2010/main">
+                <a:solidFill>
+                  <a:schemeClr val="accent1"/>
+                </a:solidFill>
+              </a14:hiddenFill>
+            </a:ext>
+            <a:ext uri="{91240B29-F687-4F45-9708-019B960494DF}">
+              <a14:hiddenLine xmlns:a14="http://schemas.microsoft.com/office/drawing/2010/main" w="9525">
+                <a:solidFill>
+                  <a:schemeClr val="tx1"/>
+                </a:solidFill>
+                <a:miter lim="800000"/>
+                <a:headEnd/>
+                <a:tailEnd/>
+              </a14:hiddenLine>
+            </a:ext>
+            <a:ext uri="{AF507438-7753-43E0-B8FC-AC1667EBCBE1}">
+              <a14:hiddenEffects xmlns:a14="http://schemas.microsoft.com/office/drawing/2010/main">
+                <a:effectLst>
+                  <a:outerShdw dist="35921" dir="2700000" algn="ctr" rotWithShape="0">
+                    <a:schemeClr val="bg2"/>
+                  </a:outerShdw>
+                </a:effectLst>
+              </a14:hiddenEffects>
+            </a:ext>
+          </a:extLst>
+        </p:spPr>
+      </p:pic>
+      <p:pic>
+        <p:nvPicPr>
+          <p:cNvPr id="1028" name="Picture 4">
+            <a:hlinkClick r:id="rId3" tooltip="Telerik Software Academy"/>
+          </p:cNvPr>
+          <p:cNvPicPr>
+            <a:picLocks noChangeAspect="1" noChangeArrowheads="1"/>
+          </p:cNvPicPr>
+          <p:nvPr/>
+        </p:nvPicPr>
+        <p:blipFill>
+          <a:blip r:embed="rId7">
+            <a:extLst>
+              <a:ext uri="{28A0092B-C50C-407E-A947-70E740481C1C}">
+                <a14:useLocalDpi xmlns:a14="http://schemas.microsoft.com/office/drawing/2010/main" val="0"/>
+              </a:ext>
+            </a:extLst>
+          </a:blip>
+          <a:srcRect/>
+          <a:stretch>
+            <a:fillRect/>
+          </a:stretch>
+        </p:blipFill>
+        <p:spPr bwMode="auto">
+          <a:xfrm>
+            <a:off x="5548941" y="2667000"/>
+            <a:ext cx="3137859" cy="918234"/>
+          </a:xfrm>
+          <a:prstGeom prst="rect">
+            <a:avLst/>
+          </a:prstGeom>
+          <a:noFill/>
+          <a:ln>
+            <a:solidFill>
+              <a:srgbClr val="9BCC00"/>
+            </a:solidFill>
+          </a:ln>
+          <a:extLst>
+            <a:ext uri="{909E8E84-426E-40DD-AFC4-6F175D3DCCD1}">
+              <a14:hiddenFill xmlns:a14="http://schemas.microsoft.com/office/drawing/2010/main">
+                <a:solidFill>
+                  <a:srgbClr val="FFFFFF"/>
+                </a:solidFill>
+              </a14:hiddenFill>
+            </a:ext>
+          </a:extLst>
+        </p:spPr>
+      </p:pic>
+      <p:pic>
+        <p:nvPicPr>
+          <p:cNvPr id="1037" name="Picture 13">
+            <a:hlinkClick r:id="rId8" tooltip="Telerik Academy @ Facebook"/>
+          </p:cNvPr>
+          <p:cNvPicPr>
+            <a:picLocks noChangeAspect="1" noChangeArrowheads="1"/>
+          </p:cNvPicPr>
+          <p:nvPr/>
+        </p:nvPicPr>
+        <p:blipFill>
+          <a:blip r:embed="rId9">
+            <a:extLst>
+              <a:ext uri="{28A0092B-C50C-407E-A947-70E740481C1C}">
+                <a14:useLocalDpi xmlns:a14="http://schemas.microsoft.com/office/drawing/2010/main" val="0"/>
+              </a:ext>
+            </a:extLst>
+          </a:blip>
+          <a:srcRect/>
+          <a:stretch>
+            <a:fillRect/>
+          </a:stretch>
+        </p:blipFill>
+        <p:spPr bwMode="auto">
+          <a:xfrm>
+            <a:off x="7748587" y="4003901"/>
+            <a:ext cx="938213" cy="938213"/>
+          </a:xfrm>
+          <a:prstGeom prst="rect">
+            <a:avLst/>
+          </a:prstGeom>
+          <a:noFill/>
+          <a:ln>
+            <a:noFill/>
+          </a:ln>
+          <a:effectLst/>
+          <a:extLst>
+            <a:ext uri="{909E8E84-426E-40DD-AFC4-6F175D3DCCD1}">
+              <a14:hiddenFill xmlns:a14="http://schemas.microsoft.com/office/drawing/2010/main">
+                <a:solidFill>
+                  <a:schemeClr val="accent1"/>
+                </a:solidFill>
+              </a14:hiddenFill>
+            </a:ext>
+            <a:ext uri="{91240B29-F687-4F45-9708-019B960494DF}">
+              <a14:hiddenLine xmlns:a14="http://schemas.microsoft.com/office/drawing/2010/main" w="9525">
+                <a:solidFill>
+                  <a:schemeClr val="tx1"/>
+                </a:solidFill>
+                <a:miter lim="800000"/>
+                <a:headEnd/>
+                <a:tailEnd/>
+              </a14:hiddenLine>
+            </a:ext>
+            <a:ext uri="{AF507438-7753-43E0-B8FC-AC1667EBCBE1}">
+              <a14:hiddenEffects xmlns:a14="http://schemas.microsoft.com/office/drawing/2010/main">
+                <a:effectLst>
+                  <a:outerShdw dist="35921" dir="2700000" algn="ctr" rotWithShape="0">
+                    <a:schemeClr val="bg2"/>
+                  </a:outerShdw>
+                </a:effectLst>
+              </a14:hiddenEffects>
+            </a:ext>
+          </a:extLst>
+        </p:spPr>
+      </p:pic>
+      <p:pic>
+        <p:nvPicPr>
+          <p:cNvPr id="2" name="Picture 1">
+            <a:hlinkClick r:id="rId2"/>
+          </p:cNvPr>
+          <p:cNvPicPr>
+            <a:picLocks noChangeAspect="1"/>
+          </p:cNvPicPr>
+          <p:nvPr/>
+        </p:nvPicPr>
+        <p:blipFill>
+          <a:blip r:embed="rId10" cstate="print">
+            <a:extLst>
+              <a:ext uri="{28A0092B-C50C-407E-A947-70E740481C1C}">
+                <a14:useLocalDpi xmlns:a14="http://schemas.microsoft.com/office/drawing/2010/main" val="0"/>
+              </a:ext>
+            </a:extLst>
+          </a:blip>
+          <a:stretch>
+            <a:fillRect/>
+          </a:stretch>
+        </p:blipFill>
+        <p:spPr>
+          <a:xfrm>
+            <a:off x="7562025" y="1123558"/>
+            <a:ext cx="1124775" cy="1124775"/>
+          </a:xfrm>
+          <a:prstGeom prst="rect">
+            <a:avLst/>
+          </a:prstGeom>
+        </p:spPr>
+      </p:pic>
+      <p:sp>
+        <p:nvSpPr>
+          <p:cNvPr id="6" name="Slide Number Placeholder 5"/>
+          <p:cNvSpPr>
+            <a:spLocks noGrp="1"/>
+          </p:cNvSpPr>
+          <p:nvPr>
+            <p:ph type="sldNum" sz="quarter" idx="10"/>
+          </p:nvPr>
+        </p:nvSpPr>
+        <p:spPr/>
+        <p:txBody>
+          <a:bodyPr/>
+          <a:lstStyle/>
+          <a:p>
+            <a:pPr>
+              <a:defRPr/>
+            </a:pPr>
+            <a:fld id="{58452FF4-89E3-4D1B-9927-2DBDC00E58D7}" type="slidenum">
+              <a:rPr lang="en-US" smtClean="0"/>
+              <a:pPr>
+                <a:defRPr/>
+              </a:pPr>
+              <a:t>49</a:t>
+            </a:fld>
+            <a:endParaRPr lang="en-US" dirty="0"/>
+          </a:p>
+        </p:txBody>
+      </p:sp>
+    </p:spTree>
+    <p:extLst>
+      <p:ext uri="{BB962C8B-B14F-4D97-AF65-F5344CB8AC3E}">
+        <p14:creationId xmlns:p14="http://schemas.microsoft.com/office/powerpoint/2010/main" val="15045004"/>
       </p:ext>
     </p:extLst>
   </p:cSld>
@@ -29405,595 +29343,6 @@
       <p:transition spd="slow"/>
     </mc:Fallback>
   </mc:AlternateContent>
-  <p:timing>
-    <p:tnLst>
-      <p:par>
-        <p:cTn id="1" dur="indefinite" restart="never" nodeType="tmRoot"/>
-      </p:par>
-    </p:tnLst>
-  </p:timing>
-</p:sld>
-</file>
-
-<file path=ppt/slides/slide50.xml><?xml version="1.0" encoding="utf-8"?>
-<p:sld xmlns:a="http://schemas.openxmlformats.org/drawingml/2006/main" xmlns:r="http://schemas.openxmlformats.org/officeDocument/2006/relationships" xmlns:p="http://schemas.openxmlformats.org/presentationml/2006/main">
-  <p:cSld>
-    <p:spTree>
-      <p:nvGrpSpPr>
-        <p:cNvPr id="1" name=""/>
-        <p:cNvGrpSpPr/>
-        <p:nvPr/>
-      </p:nvGrpSpPr>
-      <p:grpSpPr>
-        <a:xfrm>
-          <a:off x="0" y="0"/>
-          <a:ext cx="0" cy="0"/>
-          <a:chOff x="0" y="0"/>
-          <a:chExt cx="0" cy="0"/>
-        </a:xfrm>
-      </p:grpSpPr>
-      <p:sp>
-        <p:nvSpPr>
-          <p:cNvPr id="2" name="Title 1"/>
-          <p:cNvSpPr>
-            <a:spLocks noGrp="1"/>
-          </p:cNvSpPr>
-          <p:nvPr>
-            <p:ph type="title"/>
-          </p:nvPr>
-        </p:nvSpPr>
-        <p:spPr/>
-        <p:txBody>
-          <a:bodyPr/>
-          <a:lstStyle/>
-          <a:p>
-            <a:r>
-              <a:rPr lang="en-US" dirty="0"/>
-              <a:t>Introduction to ASP.NET </a:t>
-            </a:r>
-            <a:r>
-              <a:rPr lang="en-US" dirty="0" smtClean="0"/>
-              <a:t>MVC</a:t>
-            </a:r>
-            <a:endParaRPr lang="en-US" dirty="0"/>
-          </a:p>
-        </p:txBody>
-      </p:sp>
-      <p:sp>
-        <p:nvSpPr>
-          <p:cNvPr id="3" name="Text Placeholder 2"/>
-          <p:cNvSpPr>
-            <a:spLocks noGrp="1"/>
-          </p:cNvSpPr>
-          <p:nvPr>
-            <p:ph type="body" sz="quarter" idx="10"/>
-          </p:nvPr>
-        </p:nvSpPr>
-        <p:spPr>
-          <a:xfrm>
-            <a:off x="6115980" y="6400800"/>
-            <a:ext cx="2909707" cy="369332"/>
-          </a:xfrm>
-        </p:spPr>
-        <p:txBody>
-          <a:bodyPr/>
-          <a:lstStyle/>
-          <a:p>
-            <a:r>
-              <a:rPr lang="en-US" dirty="0">
-                <a:hlinkClick r:id="rId2"/>
-              </a:rPr>
-              <a:t>http</a:t>
-            </a:r>
-            <a:r>
-              <a:rPr lang="en-US" dirty="0" smtClean="0">
-                <a:hlinkClick r:id="rId2"/>
-              </a:rPr>
-              <a:t>://academy.telerik.com</a:t>
-            </a:r>
-            <a:endParaRPr lang="en-US" dirty="0"/>
-          </a:p>
-        </p:txBody>
-      </p:sp>
-    </p:spTree>
-    <p:extLst>
-      <p:ext uri="{BB962C8B-B14F-4D97-AF65-F5344CB8AC3E}">
-        <p14:creationId xmlns:p14="http://schemas.microsoft.com/office/powerpoint/2010/main" val="3133162700"/>
-      </p:ext>
-    </p:extLst>
-  </p:cSld>
-  <p:clrMapOvr>
-    <a:masterClrMapping/>
-  </p:clrMapOvr>
-  <p:timing>
-    <p:tnLst>
-      <p:par>
-        <p:cTn id="1" dur="indefinite" restart="never" nodeType="tmRoot"/>
-      </p:par>
-    </p:tnLst>
-  </p:timing>
-</p:sld>
-</file>
-
-<file path=ppt/slides/slide51.xml><?xml version="1.0" encoding="utf-8"?>
-<p:sld xmlns:a="http://schemas.openxmlformats.org/drawingml/2006/main" xmlns:r="http://schemas.openxmlformats.org/officeDocument/2006/relationships" xmlns:p="http://schemas.openxmlformats.org/presentationml/2006/main">
-  <p:cSld>
-    <p:spTree>
-      <p:nvGrpSpPr>
-        <p:cNvPr id="1" name=""/>
-        <p:cNvGrpSpPr/>
-        <p:nvPr/>
-      </p:nvGrpSpPr>
-      <p:grpSpPr>
-        <a:xfrm>
-          <a:off x="0" y="0"/>
-          <a:ext cx="0" cy="0"/>
-          <a:chOff x="0" y="0"/>
-          <a:chExt cx="0" cy="0"/>
-        </a:xfrm>
-      </p:grpSpPr>
-      <p:sp>
-        <p:nvSpPr>
-          <p:cNvPr id="3" name="Title 2"/>
-          <p:cNvSpPr>
-            <a:spLocks noGrp="1"/>
-          </p:cNvSpPr>
-          <p:nvPr>
-            <p:ph type="title"/>
-          </p:nvPr>
-        </p:nvSpPr>
-        <p:spPr/>
-        <p:txBody>
-          <a:bodyPr/>
-          <a:lstStyle/>
-          <a:p>
-            <a:r>
-              <a:rPr lang="en-US" sz="3600" dirty="0" smtClean="0"/>
-              <a:t>Free Trainings @ Telerik Academy</a:t>
-            </a:r>
-            <a:endParaRPr lang="en-US" sz="3600" dirty="0"/>
-          </a:p>
-        </p:txBody>
-      </p:sp>
-      <p:sp>
-        <p:nvSpPr>
-          <p:cNvPr id="4" name="Content Placeholder 3"/>
-          <p:cNvSpPr>
-            <a:spLocks noGrp="1"/>
-          </p:cNvSpPr>
-          <p:nvPr>
-            <p:ph idx="1"/>
-          </p:nvPr>
-        </p:nvSpPr>
-        <p:spPr>
-          <a:xfrm>
-            <a:off x="228600" y="1066800"/>
-            <a:ext cx="8686800" cy="5638800"/>
-          </a:xfrm>
-        </p:spPr>
-        <p:txBody>
-          <a:bodyPr/>
-          <a:lstStyle/>
-          <a:p>
-            <a:r>
-              <a:rPr lang="en-US" dirty="0" smtClean="0"/>
-              <a:t>“C# Programming @ Telerik Academy</a:t>
-            </a:r>
-          </a:p>
-          <a:p>
-            <a:pPr marL="574675" lvl="2" indent="-282575">
-              <a:buClr>
-                <a:schemeClr val="accent5">
-                  <a:lumMod val="40000"/>
-                  <a:lumOff val="60000"/>
-                </a:schemeClr>
-              </a:buClr>
-              <a:buSzPct val="70000"/>
-              <a:buFont typeface="Wingdings 2" pitchFamily="18" charset="2"/>
-              <a:buChar char=""/>
-              <a:tabLst>
-                <a:tab pos="282575" algn="l"/>
-              </a:tabLst>
-            </a:pPr>
-            <a:r>
-              <a:rPr lang="en-US" noProof="1">
-                <a:hlinkClick r:id="rId2"/>
-              </a:rPr>
-              <a:t>csharpfundamentals.telerik.com</a:t>
-            </a:r>
-            <a:endParaRPr lang="en-US" noProof="1"/>
-          </a:p>
-          <a:p>
-            <a:pPr marL="282575" lvl="1" indent="-282575">
-              <a:spcBef>
-                <a:spcPts val="1800"/>
-              </a:spcBef>
-              <a:buClr>
-                <a:schemeClr val="accent5">
-                  <a:lumMod val="40000"/>
-                  <a:lumOff val="60000"/>
-                </a:schemeClr>
-              </a:buClr>
-              <a:buSzPct val="70000"/>
-              <a:buFont typeface="Wingdings 2" pitchFamily="18" charset="2"/>
-              <a:buChar char=""/>
-              <a:tabLst>
-                <a:tab pos="282575" algn="l"/>
-              </a:tabLst>
-            </a:pPr>
-            <a:r>
-              <a:rPr lang="en-US" dirty="0" smtClean="0"/>
-              <a:t>Telerik Software Academy</a:t>
-            </a:r>
-          </a:p>
-          <a:p>
-            <a:pPr marL="574675" lvl="2" indent="-282575">
-              <a:buClr>
-                <a:schemeClr val="accent5">
-                  <a:lumMod val="40000"/>
-                  <a:lumOff val="60000"/>
-                </a:schemeClr>
-              </a:buClr>
-              <a:buSzPct val="70000"/>
-              <a:buFont typeface="Wingdings 2" pitchFamily="18" charset="2"/>
-              <a:buChar char=""/>
-              <a:tabLst>
-                <a:tab pos="282575" algn="l"/>
-              </a:tabLst>
-            </a:pPr>
-            <a:r>
-              <a:rPr lang="en-US" noProof="1" smtClean="0">
-                <a:hlinkClick r:id="rId3" tooltip="Telerik Software Academy - Free Programming Courses"/>
-              </a:rPr>
-              <a:t>academy.telerik.com</a:t>
-            </a:r>
-            <a:endParaRPr lang="en-US" noProof="1" smtClean="0"/>
-          </a:p>
-          <a:p>
-            <a:pPr marL="282575" lvl="1" indent="-282575">
-              <a:spcBef>
-                <a:spcPts val="1800"/>
-              </a:spcBef>
-              <a:buClr>
-                <a:schemeClr val="accent5">
-                  <a:lumMod val="40000"/>
-                  <a:lumOff val="60000"/>
-                </a:schemeClr>
-              </a:buClr>
-              <a:buSzPct val="70000"/>
-              <a:buFont typeface="Wingdings 2" pitchFamily="18" charset="2"/>
-              <a:buChar char=""/>
-              <a:tabLst>
-                <a:tab pos="282575" algn="l"/>
-              </a:tabLst>
-            </a:pPr>
-            <a:r>
-              <a:rPr lang="en-US" dirty="0" smtClean="0"/>
-              <a:t>Telerik Academy @ Facebook</a:t>
-            </a:r>
-          </a:p>
-          <a:p>
-            <a:pPr marL="574675" lvl="2" indent="-282575">
-              <a:buClr>
-                <a:schemeClr val="accent5">
-                  <a:lumMod val="40000"/>
-                  <a:lumOff val="60000"/>
-                </a:schemeClr>
-              </a:buClr>
-              <a:buSzPct val="70000"/>
-              <a:buFont typeface="Wingdings 2" pitchFamily="18" charset="2"/>
-              <a:buChar char=""/>
-              <a:tabLst>
-                <a:tab pos="282575" algn="l"/>
-              </a:tabLst>
-            </a:pPr>
-            <a:r>
-              <a:rPr lang="en-US" noProof="1" smtClean="0">
-                <a:hlinkClick r:id="rId4" tooltip="Telerik Softyware Academy @ Facebook"/>
-              </a:rPr>
-              <a:t>facebook.com/TelerikAcademy</a:t>
-            </a:r>
-            <a:endParaRPr lang="en-US" noProof="1" smtClean="0"/>
-          </a:p>
-          <a:p>
-            <a:pPr marL="282575" lvl="1" indent="-282575">
-              <a:spcBef>
-                <a:spcPts val="1800"/>
-              </a:spcBef>
-              <a:buClr>
-                <a:schemeClr val="accent5">
-                  <a:lumMod val="40000"/>
-                  <a:lumOff val="60000"/>
-                </a:schemeClr>
-              </a:buClr>
-              <a:buSzPct val="70000"/>
-              <a:buFont typeface="Wingdings 2" pitchFamily="18" charset="2"/>
-              <a:buChar char=""/>
-              <a:tabLst>
-                <a:tab pos="282575" algn="l"/>
-              </a:tabLst>
-            </a:pPr>
-            <a:r>
-              <a:rPr lang="en-US" dirty="0" smtClean="0"/>
-              <a:t>Telerik Software Academy Forums</a:t>
-            </a:r>
-          </a:p>
-          <a:p>
-            <a:pPr marL="574675" lvl="2" indent="-282575">
-              <a:buClr>
-                <a:schemeClr val="accent5">
-                  <a:lumMod val="40000"/>
-                  <a:lumOff val="60000"/>
-                </a:schemeClr>
-              </a:buClr>
-              <a:buSzPct val="70000"/>
-              <a:buFont typeface="Wingdings 2" pitchFamily="18" charset="2"/>
-              <a:buChar char=""/>
-              <a:tabLst>
-                <a:tab pos="282575" algn="l"/>
-              </a:tabLst>
-            </a:pPr>
-            <a:r>
-              <a:rPr lang="en-US" noProof="1" smtClean="0">
-                <a:hlinkClick r:id="rId5" tooltip="Telerik Software Academy Forums - Community for Programmers"/>
-              </a:rPr>
-              <a:t>forums.academy.telerik.com</a:t>
-            </a:r>
-            <a:endParaRPr lang="en-US" noProof="1"/>
-          </a:p>
-        </p:txBody>
-      </p:sp>
-      <p:pic>
-        <p:nvPicPr>
-          <p:cNvPr id="5" name="Picture 5">
-            <a:hlinkClick r:id="rId5" tooltip="Telerik Software Academy Forums - Discussion Board for Developers"/>
-          </p:cNvPr>
-          <p:cNvPicPr>
-            <a:picLocks noChangeAspect="1" noChangeArrowheads="1"/>
-          </p:cNvPicPr>
-          <p:nvPr/>
-        </p:nvPicPr>
-        <p:blipFill>
-          <a:blip r:embed="rId6">
-            <a:extLst>
-              <a:ext uri="{28A0092B-C50C-407E-A947-70E740481C1C}">
-                <a14:useLocalDpi xmlns:a14="http://schemas.microsoft.com/office/drawing/2010/main" val="0"/>
-              </a:ext>
-            </a:extLst>
-          </a:blip>
-          <a:srcRect/>
-          <a:stretch>
-            <a:fillRect/>
-          </a:stretch>
-        </p:blipFill>
-        <p:spPr bwMode="auto">
-          <a:xfrm>
-            <a:off x="7523898" y="5218092"/>
-            <a:ext cx="1162902" cy="1268619"/>
-          </a:xfrm>
-          <a:prstGeom prst="rect">
-            <a:avLst/>
-          </a:prstGeom>
-          <a:noFill/>
-          <a:ln>
-            <a:noFill/>
-          </a:ln>
-          <a:effectLst/>
-          <a:extLst>
-            <a:ext uri="{909E8E84-426E-40DD-AFC4-6F175D3DCCD1}">
-              <a14:hiddenFill xmlns:a14="http://schemas.microsoft.com/office/drawing/2010/main">
-                <a:solidFill>
-                  <a:schemeClr val="accent1"/>
-                </a:solidFill>
-              </a14:hiddenFill>
-            </a:ext>
-            <a:ext uri="{91240B29-F687-4F45-9708-019B960494DF}">
-              <a14:hiddenLine xmlns:a14="http://schemas.microsoft.com/office/drawing/2010/main" w="9525">
-                <a:solidFill>
-                  <a:schemeClr val="tx1"/>
-                </a:solidFill>
-                <a:miter lim="800000"/>
-                <a:headEnd/>
-                <a:tailEnd/>
-              </a14:hiddenLine>
-            </a:ext>
-            <a:ext uri="{AF507438-7753-43E0-B8FC-AC1667EBCBE1}">
-              <a14:hiddenEffects xmlns:a14="http://schemas.microsoft.com/office/drawing/2010/main">
-                <a:effectLst>
-                  <a:outerShdw dist="35921" dir="2700000" algn="ctr" rotWithShape="0">
-                    <a:schemeClr val="bg2"/>
-                  </a:outerShdw>
-                </a:effectLst>
-              </a14:hiddenEffects>
-            </a:ext>
-          </a:extLst>
-        </p:spPr>
-      </p:pic>
-      <p:pic>
-        <p:nvPicPr>
-          <p:cNvPr id="1028" name="Picture 4">
-            <a:hlinkClick r:id="rId3" tooltip="Telerik Software Academy"/>
-          </p:cNvPr>
-          <p:cNvPicPr>
-            <a:picLocks noChangeAspect="1" noChangeArrowheads="1"/>
-          </p:cNvPicPr>
-          <p:nvPr/>
-        </p:nvPicPr>
-        <p:blipFill>
-          <a:blip r:embed="rId7">
-            <a:extLst>
-              <a:ext uri="{28A0092B-C50C-407E-A947-70E740481C1C}">
-                <a14:useLocalDpi xmlns:a14="http://schemas.microsoft.com/office/drawing/2010/main" val="0"/>
-              </a:ext>
-            </a:extLst>
-          </a:blip>
-          <a:srcRect/>
-          <a:stretch>
-            <a:fillRect/>
-          </a:stretch>
-        </p:blipFill>
-        <p:spPr bwMode="auto">
-          <a:xfrm>
-            <a:off x="5548941" y="2667000"/>
-            <a:ext cx="3137859" cy="918234"/>
-          </a:xfrm>
-          <a:prstGeom prst="rect">
-            <a:avLst/>
-          </a:prstGeom>
-          <a:noFill/>
-          <a:ln>
-            <a:solidFill>
-              <a:srgbClr val="9BCC00"/>
-            </a:solidFill>
-          </a:ln>
-          <a:extLst>
-            <a:ext uri="{909E8E84-426E-40DD-AFC4-6F175D3DCCD1}">
-              <a14:hiddenFill xmlns:a14="http://schemas.microsoft.com/office/drawing/2010/main">
-                <a:solidFill>
-                  <a:srgbClr val="FFFFFF"/>
-                </a:solidFill>
-              </a14:hiddenFill>
-            </a:ext>
-          </a:extLst>
-        </p:spPr>
-      </p:pic>
-      <p:pic>
-        <p:nvPicPr>
-          <p:cNvPr id="1037" name="Picture 13">
-            <a:hlinkClick r:id="rId8" tooltip="Telerik Academy @ Facebook"/>
-          </p:cNvPr>
-          <p:cNvPicPr>
-            <a:picLocks noChangeAspect="1" noChangeArrowheads="1"/>
-          </p:cNvPicPr>
-          <p:nvPr/>
-        </p:nvPicPr>
-        <p:blipFill>
-          <a:blip r:embed="rId9">
-            <a:extLst>
-              <a:ext uri="{28A0092B-C50C-407E-A947-70E740481C1C}">
-                <a14:useLocalDpi xmlns:a14="http://schemas.microsoft.com/office/drawing/2010/main" val="0"/>
-              </a:ext>
-            </a:extLst>
-          </a:blip>
-          <a:srcRect/>
-          <a:stretch>
-            <a:fillRect/>
-          </a:stretch>
-        </p:blipFill>
-        <p:spPr bwMode="auto">
-          <a:xfrm>
-            <a:off x="7748587" y="4003901"/>
-            <a:ext cx="938213" cy="938213"/>
-          </a:xfrm>
-          <a:prstGeom prst="rect">
-            <a:avLst/>
-          </a:prstGeom>
-          <a:noFill/>
-          <a:ln>
-            <a:noFill/>
-          </a:ln>
-          <a:effectLst/>
-          <a:extLst>
-            <a:ext uri="{909E8E84-426E-40DD-AFC4-6F175D3DCCD1}">
-              <a14:hiddenFill xmlns:a14="http://schemas.microsoft.com/office/drawing/2010/main">
-                <a:solidFill>
-                  <a:schemeClr val="accent1"/>
-                </a:solidFill>
-              </a14:hiddenFill>
-            </a:ext>
-            <a:ext uri="{91240B29-F687-4F45-9708-019B960494DF}">
-              <a14:hiddenLine xmlns:a14="http://schemas.microsoft.com/office/drawing/2010/main" w="9525">
-                <a:solidFill>
-                  <a:schemeClr val="tx1"/>
-                </a:solidFill>
-                <a:miter lim="800000"/>
-                <a:headEnd/>
-                <a:tailEnd/>
-              </a14:hiddenLine>
-            </a:ext>
-            <a:ext uri="{AF507438-7753-43E0-B8FC-AC1667EBCBE1}">
-              <a14:hiddenEffects xmlns:a14="http://schemas.microsoft.com/office/drawing/2010/main">
-                <a:effectLst>
-                  <a:outerShdw dist="35921" dir="2700000" algn="ctr" rotWithShape="0">
-                    <a:schemeClr val="bg2"/>
-                  </a:outerShdw>
-                </a:effectLst>
-              </a14:hiddenEffects>
-            </a:ext>
-          </a:extLst>
-        </p:spPr>
-      </p:pic>
-      <p:pic>
-        <p:nvPicPr>
-          <p:cNvPr id="2" name="Picture 1">
-            <a:hlinkClick r:id="rId2"/>
-          </p:cNvPr>
-          <p:cNvPicPr>
-            <a:picLocks noChangeAspect="1"/>
-          </p:cNvPicPr>
-          <p:nvPr/>
-        </p:nvPicPr>
-        <p:blipFill>
-          <a:blip r:embed="rId10" cstate="print">
-            <a:extLst>
-              <a:ext uri="{28A0092B-C50C-407E-A947-70E740481C1C}">
-                <a14:useLocalDpi xmlns:a14="http://schemas.microsoft.com/office/drawing/2010/main" val="0"/>
-              </a:ext>
-            </a:extLst>
-          </a:blip>
-          <a:stretch>
-            <a:fillRect/>
-          </a:stretch>
-        </p:blipFill>
-        <p:spPr>
-          <a:xfrm>
-            <a:off x="7562025" y="1123558"/>
-            <a:ext cx="1124775" cy="1124775"/>
-          </a:xfrm>
-          <a:prstGeom prst="rect">
-            <a:avLst/>
-          </a:prstGeom>
-        </p:spPr>
-      </p:pic>
-      <p:sp>
-        <p:nvSpPr>
-          <p:cNvPr id="6" name="Slide Number Placeholder 5"/>
-          <p:cNvSpPr>
-            <a:spLocks noGrp="1"/>
-          </p:cNvSpPr>
-          <p:nvPr>
-            <p:ph type="sldNum" sz="quarter" idx="10"/>
-          </p:nvPr>
-        </p:nvSpPr>
-        <p:spPr/>
-        <p:txBody>
-          <a:bodyPr/>
-          <a:lstStyle/>
-          <a:p>
-            <a:pPr>
-              <a:defRPr/>
-            </a:pPr>
-            <a:fld id="{58452FF4-89E3-4D1B-9927-2DBDC00E58D7}" type="slidenum">
-              <a:rPr lang="en-US" smtClean="0"/>
-              <a:pPr>
-                <a:defRPr/>
-              </a:pPr>
-              <a:t>51</a:t>
-            </a:fld>
-            <a:endParaRPr lang="en-US" dirty="0"/>
-          </a:p>
-        </p:txBody>
-      </p:sp>
-    </p:spTree>
-    <p:extLst>
-      <p:ext uri="{BB962C8B-B14F-4D97-AF65-F5344CB8AC3E}">
-        <p14:creationId xmlns:p14="http://schemas.microsoft.com/office/powerpoint/2010/main" val="15045004"/>
-      </p:ext>
-    </p:extLst>
-  </p:cSld>
-  <p:clrMapOvr>
-    <a:masterClrMapping/>
-  </p:clrMapOvr>
   <p:timing>
     <p:tnLst>
       <p:par>

</xml_diff>

<commit_message>
Fixes in introduction slides
</commit_message>
<xml_diff>
--- a/01. Introduction-to-ASP.NET-MVC/Introduction to ASP.NET MVC.pptx
+++ b/01. Introduction-to-ASP.NET-MVC/Introduction to ASP.NET MVC.pptx
@@ -5,10 +5,10 @@
     <p:sldMasterId id="2147483672" r:id="rId1"/>
   </p:sldMasterIdLst>
   <p:notesMasterIdLst>
-    <p:notesMasterId r:id="rId51"/>
+    <p:notesMasterId r:id="rId49"/>
   </p:notesMasterIdLst>
   <p:handoutMasterIdLst>
-    <p:handoutMasterId r:id="rId52"/>
+    <p:handoutMasterId r:id="rId50"/>
   </p:handoutMasterIdLst>
   <p:sldIdLst>
     <p:sldId id="338" r:id="rId2"/>
@@ -42,29 +42,27 @@
     <p:sldId id="442" r:id="rId30"/>
     <p:sldId id="366" r:id="rId31"/>
     <p:sldId id="365" r:id="rId32"/>
-    <p:sldId id="339" r:id="rId33"/>
-    <p:sldId id="345" r:id="rId34"/>
-    <p:sldId id="438" r:id="rId35"/>
-    <p:sldId id="439" r:id="rId36"/>
-    <p:sldId id="348" r:id="rId37"/>
-    <p:sldId id="369" r:id="rId38"/>
-    <p:sldId id="447" r:id="rId39"/>
-    <p:sldId id="372" r:id="rId40"/>
-    <p:sldId id="435" r:id="rId41"/>
-    <p:sldId id="383" r:id="rId42"/>
-    <p:sldId id="446" r:id="rId43"/>
-    <p:sldId id="437" r:id="rId44"/>
-    <p:sldId id="443" r:id="rId45"/>
-    <p:sldId id="445" r:id="rId46"/>
-    <p:sldId id="444" r:id="rId47"/>
-    <p:sldId id="370" r:id="rId48"/>
-    <p:sldId id="334" r:id="rId49"/>
-    <p:sldId id="403" r:id="rId50"/>
+    <p:sldId id="438" r:id="rId33"/>
+    <p:sldId id="439" r:id="rId34"/>
+    <p:sldId id="348" r:id="rId35"/>
+    <p:sldId id="369" r:id="rId36"/>
+    <p:sldId id="447" r:id="rId37"/>
+    <p:sldId id="372" r:id="rId38"/>
+    <p:sldId id="435" r:id="rId39"/>
+    <p:sldId id="383" r:id="rId40"/>
+    <p:sldId id="446" r:id="rId41"/>
+    <p:sldId id="437" r:id="rId42"/>
+    <p:sldId id="443" r:id="rId43"/>
+    <p:sldId id="445" r:id="rId44"/>
+    <p:sldId id="444" r:id="rId45"/>
+    <p:sldId id="370" r:id="rId46"/>
+    <p:sldId id="334" r:id="rId47"/>
+    <p:sldId id="403" r:id="rId48"/>
   </p:sldIdLst>
   <p:sldSz cx="9144000" cy="6858000" type="screen4x3"/>
   <p:notesSz cx="6881813" cy="9296400"/>
   <p:custDataLst>
-    <p:tags r:id="rId53"/>
+    <p:tags r:id="rId51"/>
   </p:custDataLst>
   <p:defaultTextStyle>
     <a:defPPr>
@@ -243,8 +241,6 @@
         <p14:section name="Creating ASP.NET MVC Project" id="{C1D15716-48AA-499B-9313-0183838F7B1E}">
           <p14:sldIdLst>
             <p14:sldId id="365"/>
-            <p14:sldId id="339"/>
-            <p14:sldId id="345"/>
             <p14:sldId id="438"/>
             <p14:sldId id="439"/>
             <p14:sldId id="348"/>
@@ -424,7 +420,7 @@
             <a:fld id="{3BF7C7B5-275F-4D1F-9AB4-9255447DBC73}" type="datetimeFigureOut">
               <a:rPr lang="en-US"/>
               <a:pPr/>
-              <a:t>1/30/2016</a:t>
+              <a:t>1/31/2016</a:t>
             </a:fld>
             <a:endParaRPr lang="en-US" dirty="0"/>
           </a:p>
@@ -655,7 +651,7 @@
             <a:fld id="{9B46F231-FB2B-4655-A644-E2477325E686}" type="datetimeFigureOut">
               <a:rPr lang="en-US"/>
               <a:pPr/>
-              <a:t>1/30/2016</a:t>
+              <a:t>1/31/2016</a:t>
             </a:fld>
             <a:endParaRPr lang="en-US" dirty="0"/>
           </a:p>
@@ -1313,7 +1309,7 @@
             <a:fld id="{6FB4F6EA-423E-42DF-9292-215E7D886C4E}" type="slidenum">
               <a:rPr lang="en-US" smtClean="0"/>
               <a:pPr/>
-              <a:t>43</a:t>
+              <a:t>41</a:t>
             </a:fld>
             <a:endParaRPr lang="en-US" dirty="0"/>
           </a:p>
@@ -17604,15 +17600,7 @@
             </a:pPr>
             <a:r>
               <a:rPr lang="en-US" dirty="0" smtClean="0"/>
-              <a:t>ASP.NET Core 1.0 </a:t>
-            </a:r>
-            <a:r>
-              <a:rPr lang="en-US" dirty="0" smtClean="0"/>
-              <a:t>– </a:t>
-            </a:r>
-            <a:r>
-              <a:rPr lang="en-US" dirty="0" smtClean="0"/>
-              <a:t>Some time in 2016</a:t>
+              <a:t>ASP.NET Core 1.0 – Some time in 2016</a:t>
             </a:r>
             <a:endParaRPr lang="en-US" dirty="0"/>
           </a:p>
@@ -22146,472 +22134,6 @@
       </p:grpSpPr>
       <p:sp>
         <p:nvSpPr>
-          <p:cNvPr id="4" name="Title 3"/>
-          <p:cNvSpPr>
-            <a:spLocks noGrp="1"/>
-          </p:cNvSpPr>
-          <p:nvPr>
-            <p:ph type="title"/>
-          </p:nvPr>
-        </p:nvSpPr>
-        <p:spPr/>
-        <p:txBody>
-          <a:bodyPr/>
-          <a:lstStyle/>
-          <a:p>
-            <a:r>
-              <a:rPr lang="en-US" dirty="0" smtClean="0"/>
-              <a:t>The Tools</a:t>
-            </a:r>
-            <a:endParaRPr lang="en-US" dirty="0"/>
-          </a:p>
-        </p:txBody>
-      </p:sp>
-      <p:sp>
-        <p:nvSpPr>
-          <p:cNvPr id="5" name="Content Placeholder 4"/>
-          <p:cNvSpPr>
-            <a:spLocks noGrp="1"/>
-          </p:cNvSpPr>
-          <p:nvPr>
-            <p:ph idx="1"/>
-          </p:nvPr>
-        </p:nvSpPr>
-        <p:spPr/>
-        <p:txBody>
-          <a:bodyPr/>
-          <a:lstStyle/>
-          <a:p>
-            <a:pPr>
-              <a:spcBef>
-                <a:spcPts val="300"/>
-              </a:spcBef>
-              <a:spcAft>
-                <a:spcPts val="300"/>
-              </a:spcAft>
-            </a:pPr>
-            <a:r>
-              <a:rPr lang="en-US" dirty="0" smtClean="0"/>
-              <a:t>Tools that </a:t>
-            </a:r>
-            <a:r>
-              <a:rPr lang="en-US" dirty="0" smtClean="0"/>
-              <a:t>you need</a:t>
-            </a:r>
-            <a:r>
-              <a:rPr lang="en-US" dirty="0" smtClean="0"/>
-              <a:t>:</a:t>
-            </a:r>
-          </a:p>
-          <a:p>
-            <a:pPr lvl="1">
-              <a:spcBef>
-                <a:spcPts val="300"/>
-              </a:spcBef>
-              <a:spcAft>
-                <a:spcPts val="300"/>
-              </a:spcAft>
-            </a:pPr>
-            <a:r>
-              <a:rPr lang="en-US" dirty="0" smtClean="0"/>
-              <a:t>IDE: Visual Studio </a:t>
-            </a:r>
-            <a:r>
-              <a:rPr lang="en-US" dirty="0" smtClean="0"/>
-              <a:t>2015 with Update 1</a:t>
-            </a:r>
-            <a:endParaRPr lang="en-US" dirty="0" smtClean="0"/>
-          </a:p>
-          <a:p>
-            <a:pPr lvl="1">
-              <a:spcBef>
-                <a:spcPts val="300"/>
-              </a:spcBef>
-              <a:spcAft>
-                <a:spcPts val="300"/>
-              </a:spcAft>
-            </a:pPr>
-            <a:r>
-              <a:rPr lang="en-US" dirty="0" smtClean="0"/>
-              <a:t>Framework: .NET Framework </a:t>
-            </a:r>
-            <a:r>
-              <a:rPr lang="en-US" dirty="0" smtClean="0"/>
-              <a:t>4.6</a:t>
-            </a:r>
-            <a:endParaRPr lang="en-US" dirty="0" smtClean="0"/>
-          </a:p>
-          <a:p>
-            <a:pPr lvl="1">
-              <a:spcBef>
-                <a:spcPts val="300"/>
-              </a:spcBef>
-              <a:spcAft>
-                <a:spcPts val="300"/>
-              </a:spcAft>
-            </a:pPr>
-            <a:r>
-              <a:rPr lang="en-US" dirty="0" smtClean="0"/>
-              <a:t>Web server: IIS </a:t>
-            </a:r>
-            <a:r>
-              <a:rPr lang="en-US" dirty="0" smtClean="0"/>
-              <a:t>Express</a:t>
-            </a:r>
-            <a:r>
-              <a:rPr lang="en-US" dirty="0"/>
-              <a:t> </a:t>
-            </a:r>
-            <a:r>
-              <a:rPr lang="en-US" dirty="0" smtClean="0"/>
-              <a:t>(included in VS)</a:t>
-            </a:r>
-            <a:endParaRPr lang="en-US" dirty="0" smtClean="0"/>
-          </a:p>
-          <a:p>
-            <a:pPr lvl="1">
-              <a:spcBef>
-                <a:spcPts val="300"/>
-              </a:spcBef>
-              <a:spcAft>
-                <a:spcPts val="300"/>
-              </a:spcAft>
-            </a:pPr>
-            <a:r>
-              <a:rPr lang="en-US" dirty="0" smtClean="0"/>
-              <a:t>Data: Microsoft SQL Sever (Express or </a:t>
-            </a:r>
-            <a:r>
-              <a:rPr lang="en-US" dirty="0" err="1" smtClean="0"/>
-              <a:t>LocalDB</a:t>
-            </a:r>
-            <a:r>
-              <a:rPr lang="en-US" dirty="0" smtClean="0"/>
-              <a:t>)</a:t>
-            </a:r>
-          </a:p>
-          <a:p>
-            <a:pPr>
-              <a:spcBef>
-                <a:spcPts val="300"/>
-              </a:spcBef>
-              <a:spcAft>
-                <a:spcPts val="300"/>
-              </a:spcAft>
-            </a:pPr>
-            <a:r>
-              <a:rPr lang="en-US" dirty="0" smtClean="0"/>
-              <a:t>Visual Studio installer will install everything </a:t>
-            </a:r>
-            <a:r>
-              <a:rPr lang="en-US" dirty="0" smtClean="0"/>
-              <a:t>you need</a:t>
-            </a:r>
-            <a:endParaRPr lang="en-US" dirty="0" smtClean="0">
-              <a:hlinkClick r:id="rId2"/>
-            </a:endParaRPr>
-          </a:p>
-          <a:p>
-            <a:pPr lvl="1">
-              <a:spcBef>
-                <a:spcPts val="300"/>
-              </a:spcBef>
-              <a:spcAft>
-                <a:spcPts val="300"/>
-              </a:spcAft>
-            </a:pPr>
-            <a:r>
-              <a:rPr lang="en-US" dirty="0">
-                <a:hlinkClick r:id="rId3"/>
-              </a:rPr>
-              <a:t>https://</a:t>
-            </a:r>
-            <a:r>
-              <a:rPr lang="en-US" dirty="0" smtClean="0">
-                <a:hlinkClick r:id="rId3"/>
-              </a:rPr>
-              <a:t>www.visualstudio.com/downloads/download-visual-studio-vs</a:t>
-            </a:r>
-            <a:endParaRPr lang="en-US" dirty="0" smtClean="0"/>
-          </a:p>
-        </p:txBody>
-      </p:sp>
-      <p:sp>
-        <p:nvSpPr>
-          <p:cNvPr id="2" name="Slide Number Placeholder 1"/>
-          <p:cNvSpPr>
-            <a:spLocks noGrp="1"/>
-          </p:cNvSpPr>
-          <p:nvPr>
-            <p:ph type="sldNum" sz="quarter" idx="10"/>
-          </p:nvPr>
-        </p:nvSpPr>
-        <p:spPr/>
-        <p:txBody>
-          <a:bodyPr/>
-          <a:lstStyle/>
-          <a:p>
-            <a:pPr>
-              <a:defRPr/>
-            </a:pPr>
-            <a:fld id="{58452FF4-89E3-4D1B-9927-2DBDC00E58D7}" type="slidenum">
-              <a:rPr lang="en-US" smtClean="0"/>
-              <a:pPr>
-                <a:defRPr/>
-              </a:pPr>
-              <a:t>32</a:t>
-            </a:fld>
-            <a:endParaRPr lang="en-US" dirty="0"/>
-          </a:p>
-        </p:txBody>
-      </p:sp>
-    </p:spTree>
-    <p:extLst>
-      <p:ext uri="{BB962C8B-B14F-4D97-AF65-F5344CB8AC3E}">
-        <p14:creationId xmlns:p14="http://schemas.microsoft.com/office/powerpoint/2010/main" val="3843600284"/>
-      </p:ext>
-    </p:extLst>
-  </p:cSld>
-  <p:clrMapOvr>
-    <a:masterClrMapping/>
-  </p:clrMapOvr>
-  <p:timing>
-    <p:tnLst>
-      <p:par>
-        <p:cTn id="1" dur="indefinite" restart="never" nodeType="tmRoot"/>
-      </p:par>
-    </p:tnLst>
-  </p:timing>
-</p:sld>
-</file>
-
-<file path=ppt/slides/slide33.xml><?xml version="1.0" encoding="utf-8"?>
-<p:sld xmlns:a="http://schemas.openxmlformats.org/drawingml/2006/main" xmlns:r="http://schemas.openxmlformats.org/officeDocument/2006/relationships" xmlns:p="http://schemas.openxmlformats.org/presentationml/2006/main">
-  <p:cSld>
-    <p:spTree>
-      <p:nvGrpSpPr>
-        <p:cNvPr id="1" name=""/>
-        <p:cNvGrpSpPr/>
-        <p:nvPr/>
-      </p:nvGrpSpPr>
-      <p:grpSpPr>
-        <a:xfrm>
-          <a:off x="0" y="0"/>
-          <a:ext cx="0" cy="0"/>
-          <a:chOff x="0" y="0"/>
-          <a:chExt cx="0" cy="0"/>
-        </a:xfrm>
-      </p:grpSpPr>
-      <p:sp>
-        <p:nvSpPr>
-          <p:cNvPr id="2" name="Title 1"/>
-          <p:cNvSpPr>
-            <a:spLocks noGrp="1"/>
-          </p:cNvSpPr>
-          <p:nvPr>
-            <p:ph type="title"/>
-          </p:nvPr>
-        </p:nvSpPr>
-        <p:spPr/>
-        <p:txBody>
-          <a:bodyPr/>
-          <a:lstStyle/>
-          <a:p>
-            <a:r>
-              <a:rPr lang="en-US" dirty="0" smtClean="0"/>
-              <a:t>The Technologies</a:t>
-            </a:r>
-            <a:endParaRPr lang="en-US" dirty="0"/>
-          </a:p>
-        </p:txBody>
-      </p:sp>
-      <p:sp>
-        <p:nvSpPr>
-          <p:cNvPr id="3" name="Content Placeholder 2"/>
-          <p:cNvSpPr>
-            <a:spLocks noGrp="1"/>
-          </p:cNvSpPr>
-          <p:nvPr>
-            <p:ph idx="1"/>
-          </p:nvPr>
-        </p:nvSpPr>
-        <p:spPr/>
-        <p:txBody>
-          <a:bodyPr/>
-          <a:lstStyle/>
-          <a:p>
-            <a:r>
-              <a:rPr lang="en-US" dirty="0" smtClean="0"/>
-              <a:t>Technologies that ASP.NET MVC uses</a:t>
-            </a:r>
-          </a:p>
-          <a:p>
-            <a:pPr lvl="1"/>
-            <a:r>
-              <a:rPr lang="en-US" dirty="0" smtClean="0"/>
-              <a:t>C</a:t>
-            </a:r>
-            <a:r>
-              <a:rPr lang="en-US" dirty="0"/>
-              <a:t># (</a:t>
-            </a:r>
-            <a:r>
-              <a:rPr lang="en-US" dirty="0" smtClean="0"/>
-              <a:t>OOP, </a:t>
-            </a:r>
-            <a:r>
-              <a:rPr lang="en-US" dirty="0"/>
-              <a:t>u</a:t>
-            </a:r>
-            <a:r>
-              <a:rPr lang="en-US" dirty="0" smtClean="0"/>
-              <a:t>nit testing, </a:t>
-            </a:r>
-            <a:r>
-              <a:rPr lang="en-US" dirty="0" err="1" smtClean="0"/>
-              <a:t>async</a:t>
-            </a:r>
-            <a:r>
-              <a:rPr lang="en-US" dirty="0" smtClean="0"/>
-              <a:t>, etc.)</a:t>
-            </a:r>
-          </a:p>
-          <a:p>
-            <a:pPr lvl="1"/>
-            <a:r>
-              <a:rPr lang="en-US" dirty="0"/>
-              <a:t>ASP.NET</a:t>
-            </a:r>
-          </a:p>
-          <a:p>
-            <a:pPr lvl="1"/>
-            <a:r>
-              <a:rPr lang="en-US" dirty="0" smtClean="0"/>
-              <a:t>HTML(5) and CSS</a:t>
-            </a:r>
-          </a:p>
-          <a:p>
-            <a:pPr lvl="1"/>
-            <a:r>
-              <a:rPr lang="en-US" dirty="0" smtClean="0"/>
-              <a:t>JavaScript (jQuery, </a:t>
-            </a:r>
-            <a:r>
-              <a:rPr lang="en-US" dirty="0" err="1" smtClean="0"/>
-              <a:t>KendoUI</a:t>
-            </a:r>
-            <a:r>
-              <a:rPr lang="en-US" dirty="0" smtClean="0"/>
-              <a:t>, </a:t>
-            </a:r>
-            <a:r>
-              <a:rPr lang="en-US" dirty="0" err="1" smtClean="0"/>
-              <a:t>AngularJS</a:t>
-            </a:r>
-            <a:r>
-              <a:rPr lang="en-US" dirty="0" smtClean="0"/>
-              <a:t>, etc.)</a:t>
-            </a:r>
-          </a:p>
-          <a:p>
-            <a:pPr lvl="1"/>
-            <a:r>
-              <a:rPr lang="en-US" dirty="0" smtClean="0"/>
-              <a:t>AJAX, Single-page apps</a:t>
-            </a:r>
-          </a:p>
-          <a:p>
-            <a:pPr lvl="1"/>
-            <a:r>
-              <a:rPr lang="en-US" dirty="0" smtClean="0"/>
-              <a:t>Databases (MS SQL)</a:t>
-            </a:r>
-          </a:p>
-          <a:p>
-            <a:pPr lvl="1"/>
-            <a:r>
-              <a:rPr lang="en-US" dirty="0" smtClean="0"/>
-              <a:t>ORM (Entity Framework and LINQ)</a:t>
-            </a:r>
-          </a:p>
-          <a:p>
-            <a:pPr lvl="1"/>
-            <a:r>
-              <a:rPr lang="en-US" dirty="0" smtClean="0"/>
-              <a:t>Web and HTTP</a:t>
-            </a:r>
-            <a:endParaRPr lang="en-US" dirty="0"/>
-          </a:p>
-        </p:txBody>
-      </p:sp>
-      <p:sp>
-        <p:nvSpPr>
-          <p:cNvPr id="4" name="Slide Number Placeholder 3"/>
-          <p:cNvSpPr>
-            <a:spLocks noGrp="1"/>
-          </p:cNvSpPr>
-          <p:nvPr>
-            <p:ph type="sldNum" sz="quarter" idx="10"/>
-          </p:nvPr>
-        </p:nvSpPr>
-        <p:spPr/>
-        <p:txBody>
-          <a:bodyPr/>
-          <a:lstStyle/>
-          <a:p>
-            <a:pPr>
-              <a:defRPr/>
-            </a:pPr>
-            <a:fld id="{58452FF4-89E3-4D1B-9927-2DBDC00E58D7}" type="slidenum">
-              <a:rPr lang="en-US" smtClean="0"/>
-              <a:pPr>
-                <a:defRPr/>
-              </a:pPr>
-              <a:t>33</a:t>
-            </a:fld>
-            <a:endParaRPr lang="en-US" dirty="0"/>
-          </a:p>
-        </p:txBody>
-      </p:sp>
-    </p:spTree>
-    <p:extLst>
-      <p:ext uri="{BB962C8B-B14F-4D97-AF65-F5344CB8AC3E}">
-        <p14:creationId xmlns:p14="http://schemas.microsoft.com/office/powerpoint/2010/main" val="3878562838"/>
-      </p:ext>
-    </p:extLst>
-  </p:cSld>
-  <p:clrMapOvr>
-    <a:masterClrMapping/>
-  </p:clrMapOvr>
-  <p:timing>
-    <p:tnLst>
-      <p:par>
-        <p:cTn id="1" dur="indefinite" restart="never" nodeType="tmRoot"/>
-      </p:par>
-    </p:tnLst>
-  </p:timing>
-</p:sld>
-</file>
-
-<file path=ppt/slides/slide34.xml><?xml version="1.0" encoding="utf-8"?>
-<p:sld xmlns:a="http://schemas.openxmlformats.org/drawingml/2006/main" xmlns:r="http://schemas.openxmlformats.org/officeDocument/2006/relationships" xmlns:p="http://schemas.openxmlformats.org/presentationml/2006/main">
-  <p:cSld>
-    <p:spTree>
-      <p:nvGrpSpPr>
-        <p:cNvPr id="1" name=""/>
-        <p:cNvGrpSpPr/>
-        <p:nvPr/>
-      </p:nvGrpSpPr>
-      <p:grpSpPr>
-        <a:xfrm>
-          <a:off x="0" y="0"/>
-          <a:ext cx="0" cy="0"/>
-          <a:chOff x="0" y="0"/>
-          <a:chExt cx="0" cy="0"/>
-        </a:xfrm>
-      </p:grpSpPr>
-      <p:sp>
-        <p:nvSpPr>
           <p:cNvPr id="2" name="Title 1"/>
           <p:cNvSpPr>
             <a:spLocks noGrp="1"/>
@@ -22632,15 +22154,7 @@
           <a:p>
             <a:r>
               <a:rPr lang="en-US" dirty="0" smtClean="0"/>
-              <a:t>Visual Studio </a:t>
-            </a:r>
-            <a:r>
-              <a:rPr lang="en-US" dirty="0" smtClean="0"/>
-              <a:t>2015: </a:t>
-            </a:r>
-            <a:r>
-              <a:rPr lang="en-US" dirty="0" smtClean="0"/>
-              <a:t>New Project</a:t>
+              <a:t>Visual Studio 2015: New Project</a:t>
             </a:r>
             <a:endParaRPr lang="en-US" dirty="0"/>
           </a:p>
@@ -22669,7 +22183,7 @@
               <a:pPr>
                 <a:defRPr/>
               </a:pPr>
-              <a:t>34</a:t>
+              <a:t>32</a:t>
             </a:fld>
             <a:endParaRPr lang="en-US" dirty="0"/>
           </a:p>
@@ -23069,7 +22583,7 @@
 </p:sld>
 </file>
 
-<file path=ppt/slides/slide35.xml><?xml version="1.0" encoding="utf-8"?>
+<file path=ppt/slides/slide33.xml><?xml version="1.0" encoding="utf-8"?>
 <p:sld xmlns:a="http://schemas.openxmlformats.org/drawingml/2006/main" xmlns:r="http://schemas.openxmlformats.org/officeDocument/2006/relationships" xmlns:p="http://schemas.openxmlformats.org/presentationml/2006/main">
   <p:cSld>
     <p:spTree>
@@ -23103,15 +22617,7 @@
           <a:p>
             <a:r>
               <a:rPr lang="en-US" dirty="0" smtClean="0"/>
-              <a:t>VS </a:t>
-            </a:r>
-            <a:r>
-              <a:rPr lang="en-US" dirty="0" smtClean="0"/>
-              <a:t>2015: </a:t>
-            </a:r>
-            <a:r>
-              <a:rPr lang="en-US" dirty="0" smtClean="0"/>
-              <a:t>Default Layout</a:t>
+              <a:t>VS 2015: Default Layout</a:t>
             </a:r>
             <a:endParaRPr lang="en-US" dirty="0"/>
           </a:p>
@@ -23140,7 +22646,7 @@
               <a:pPr>
                 <a:defRPr/>
               </a:pPr>
-              <a:t>35</a:t>
+              <a:t>33</a:t>
             </a:fld>
             <a:endParaRPr lang="en-US" dirty="0"/>
           </a:p>
@@ -23453,7 +22959,7 @@
 </p:sld>
 </file>
 
-<file path=ppt/slides/slide36.xml><?xml version="1.0" encoding="utf-8"?>
+<file path=ppt/slides/slide34.xml><?xml version="1.0" encoding="utf-8"?>
 <p:sld xmlns:a="http://schemas.openxmlformats.org/drawingml/2006/main" xmlns:r="http://schemas.openxmlformats.org/officeDocument/2006/relationships" xmlns:p="http://schemas.openxmlformats.org/presentationml/2006/main">
   <p:cSld>
     <p:spTree>
@@ -23544,7 +23050,7 @@
               <a:pPr>
                 <a:defRPr/>
               </a:pPr>
-              <a:t>36</a:t>
+              <a:t>34</a:t>
             </a:fld>
             <a:endParaRPr lang="en-US" dirty="0"/>
           </a:p>
@@ -25156,7 +24662,7 @@
 </p:sld>
 </file>
 
-<file path=ppt/slides/slide37.xml><?xml version="1.0" encoding="utf-8"?>
+<file path=ppt/slides/slide35.xml><?xml version="1.0" encoding="utf-8"?>
 <p:sld xmlns:a="http://schemas.openxmlformats.org/drawingml/2006/main" xmlns:r="http://schemas.openxmlformats.org/officeDocument/2006/relationships" xmlns:p="http://schemas.openxmlformats.org/presentationml/2006/main">
   <p:cSld>
     <p:spTree>
@@ -25289,7 +24795,7 @@
 </p:sld>
 </file>
 
-<file path=ppt/slides/slide38.xml><?xml version="1.0" encoding="utf-8"?>
+<file path=ppt/slides/slide36.xml><?xml version="1.0" encoding="utf-8"?>
 <p:sld xmlns:a="http://schemas.openxmlformats.org/drawingml/2006/main" xmlns:r="http://schemas.openxmlformats.org/officeDocument/2006/relationships" xmlns:p="http://schemas.openxmlformats.org/presentationml/2006/main">
   <p:cSld>
     <p:spTree>
@@ -25435,7 +24941,7 @@
 </p:sld>
 </file>
 
-<file path=ppt/slides/slide39.xml><?xml version="1.0" encoding="utf-8"?>
+<file path=ppt/slides/slide37.xml><?xml version="1.0" encoding="utf-8"?>
 <p:sld xmlns:a="http://schemas.openxmlformats.org/drawingml/2006/main" xmlns:r="http://schemas.openxmlformats.org/officeDocument/2006/relationships" xmlns:p="http://schemas.openxmlformats.org/presentationml/2006/main">
   <p:cSld>
     <p:spTree>
@@ -25584,7 +25090,7 @@
               <a:pPr>
                 <a:defRPr/>
               </a:pPr>
-              <a:t>39</a:t>
+              <a:t>37</a:t>
             </a:fld>
             <a:endParaRPr lang="en-US" dirty="0"/>
           </a:p>
@@ -25684,228 +25190,7 @@
 </p:sld>
 </file>
 
-<file path=ppt/slides/slide4.xml><?xml version="1.0" encoding="utf-8"?>
-<p:sld xmlns:a="http://schemas.openxmlformats.org/drawingml/2006/main" xmlns:r="http://schemas.openxmlformats.org/officeDocument/2006/relationships" xmlns:p="http://schemas.openxmlformats.org/presentationml/2006/main" showMasterPhAnim="0">
-  <p:cSld>
-    <p:spTree>
-      <p:nvGrpSpPr>
-        <p:cNvPr id="1" name=""/>
-        <p:cNvGrpSpPr/>
-        <p:nvPr/>
-      </p:nvGrpSpPr>
-      <p:grpSpPr>
-        <a:xfrm>
-          <a:off x="0" y="0"/>
-          <a:ext cx="0" cy="0"/>
-          <a:chOff x="0" y="0"/>
-          <a:chExt cx="0" cy="0"/>
-        </a:xfrm>
-      </p:grpSpPr>
-      <p:sp>
-        <p:nvSpPr>
-          <p:cNvPr id="473090" name="Rectangle 2"/>
-          <p:cNvSpPr>
-            <a:spLocks noGrp="1" noChangeArrowheads="1"/>
-          </p:cNvSpPr>
-          <p:nvPr>
-            <p:ph type="title"/>
-          </p:nvPr>
-        </p:nvSpPr>
-        <p:spPr/>
-        <p:txBody>
-          <a:bodyPr/>
-          <a:lstStyle/>
-          <a:p>
-            <a:r>
-              <a:rPr lang="en-US" sz="3600" dirty="0" smtClean="0"/>
-              <a:t>HTTP</a:t>
-            </a:r>
-            <a:endParaRPr lang="en-US" sz="3600" dirty="0"/>
-          </a:p>
-        </p:txBody>
-      </p:sp>
-      <p:sp>
-        <p:nvSpPr>
-          <p:cNvPr id="473091" name="Rectangle 3"/>
-          <p:cNvSpPr>
-            <a:spLocks noGrp="1" noChangeArrowheads="1"/>
-          </p:cNvSpPr>
-          <p:nvPr>
-            <p:ph idx="1"/>
-          </p:nvPr>
-        </p:nvSpPr>
-        <p:spPr/>
-        <p:txBody>
-          <a:bodyPr/>
-          <a:lstStyle/>
-          <a:p>
-            <a:pPr>
-              <a:lnSpc>
-                <a:spcPct val="100000"/>
-              </a:lnSpc>
-            </a:pPr>
-            <a:r>
-              <a:rPr lang="en-US" dirty="0">
-                <a:solidFill>
-                  <a:schemeClr val="accent5">
-                    <a:lumMod val="20000"/>
-                    <a:lumOff val="80000"/>
-                  </a:schemeClr>
-                </a:solidFill>
-              </a:rPr>
-              <a:t>Hyper Text Transfer Protocol (HTTP)</a:t>
-            </a:r>
-          </a:p>
-          <a:p>
-            <a:pPr lvl="1">
-              <a:lnSpc>
-                <a:spcPct val="100000"/>
-              </a:lnSpc>
-            </a:pPr>
-            <a:r>
-              <a:rPr lang="en-US" dirty="0"/>
-              <a:t>Client-server protocol for transferring Web </a:t>
-            </a:r>
-            <a:r>
-              <a:rPr lang="en-US" dirty="0" smtClean="0"/>
-              <a:t>resources (HTML files, images, styles, etc.)</a:t>
-            </a:r>
-            <a:endParaRPr lang="en-US" dirty="0"/>
-          </a:p>
-          <a:p>
-            <a:pPr>
-              <a:lnSpc>
-                <a:spcPct val="100000"/>
-              </a:lnSpc>
-            </a:pPr>
-            <a:r>
-              <a:rPr lang="en-US" dirty="0"/>
-              <a:t>Important properties of HTTP</a:t>
-            </a:r>
-          </a:p>
-          <a:p>
-            <a:pPr lvl="1">
-              <a:lnSpc>
-                <a:spcPct val="100000"/>
-              </a:lnSpc>
-            </a:pPr>
-            <a:r>
-              <a:rPr lang="en-US" dirty="0"/>
-              <a:t>Request-response </a:t>
-            </a:r>
-            <a:r>
-              <a:rPr lang="en-US" dirty="0" smtClean="0"/>
-              <a:t>model</a:t>
-            </a:r>
-            <a:endParaRPr lang="en-US" dirty="0"/>
-          </a:p>
-          <a:p>
-            <a:pPr lvl="1">
-              <a:lnSpc>
-                <a:spcPct val="100000"/>
-              </a:lnSpc>
-            </a:pPr>
-            <a:r>
-              <a:rPr lang="en-US" dirty="0"/>
-              <a:t>Text-based format</a:t>
-            </a:r>
-          </a:p>
-          <a:p>
-            <a:pPr lvl="1">
-              <a:lnSpc>
-                <a:spcPct val="100000"/>
-              </a:lnSpc>
-            </a:pPr>
-            <a:r>
-              <a:rPr lang="en-US" dirty="0" smtClean="0"/>
-              <a:t>Relies </a:t>
-            </a:r>
-            <a:r>
-              <a:rPr lang="en-US" dirty="0"/>
-              <a:t>on a </a:t>
-            </a:r>
-            <a:r>
-              <a:rPr lang="en-US" dirty="0" smtClean="0"/>
-              <a:t>unique resource URLs</a:t>
-            </a:r>
-            <a:endParaRPr lang="en-US" dirty="0"/>
-          </a:p>
-          <a:p>
-            <a:pPr lvl="1">
-              <a:lnSpc>
-                <a:spcPct val="100000"/>
-              </a:lnSpc>
-            </a:pPr>
-            <a:r>
-              <a:rPr lang="en-US" dirty="0" smtClean="0"/>
-              <a:t>Provides resource metadata (e.g. encoding)</a:t>
-            </a:r>
-            <a:endParaRPr lang="en-US" dirty="0"/>
-          </a:p>
-          <a:p>
-            <a:pPr lvl="1">
-              <a:lnSpc>
-                <a:spcPct val="100000"/>
-              </a:lnSpc>
-            </a:pPr>
-            <a:r>
-              <a:rPr lang="en-US" dirty="0" smtClean="0"/>
-              <a:t>Stateless (cookies can overcome this)</a:t>
-            </a:r>
-            <a:endParaRPr lang="en-US" dirty="0"/>
-          </a:p>
-        </p:txBody>
-      </p:sp>
-      <p:sp>
-        <p:nvSpPr>
-          <p:cNvPr id="4" name="Slide Number Placeholder 3"/>
-          <p:cNvSpPr>
-            <a:spLocks noGrp="1"/>
-          </p:cNvSpPr>
-          <p:nvPr>
-            <p:ph type="sldNum" sz="quarter" idx="10"/>
-          </p:nvPr>
-        </p:nvSpPr>
-        <p:spPr/>
-        <p:txBody>
-          <a:bodyPr/>
-          <a:lstStyle/>
-          <a:p>
-            <a:pPr>
-              <a:defRPr/>
-            </a:pPr>
-            <a:fld id="{58452FF4-89E3-4D1B-9927-2DBDC00E58D7}" type="slidenum">
-              <a:rPr lang="en-US" smtClean="0"/>
-              <a:pPr>
-                <a:defRPr/>
-              </a:pPr>
-              <a:t>4</a:t>
-            </a:fld>
-            <a:endParaRPr lang="en-US" dirty="0"/>
-          </a:p>
-        </p:txBody>
-      </p:sp>
-    </p:spTree>
-    <p:extLst>
-      <p:ext uri="{BB962C8B-B14F-4D97-AF65-F5344CB8AC3E}">
-        <p14:creationId xmlns:p14="http://schemas.microsoft.com/office/powerpoint/2010/main" val="2440486903"/>
-      </p:ext>
-    </p:extLst>
-  </p:cSld>
-  <p:clrMapOvr>
-    <a:masterClrMapping/>
-  </p:clrMapOvr>
-  <p:timing>
-    <p:tnLst>
-      <p:par>
-        <p:cTn id="1" dur="indefinite" restart="never" nodeType="tmRoot"/>
-      </p:par>
-    </p:tnLst>
-  </p:timing>
-</p:sld>
-</file>
-
-<file path=ppt/slides/slide40.xml><?xml version="1.0" encoding="utf-8"?>
+<file path=ppt/slides/slide38.xml><?xml version="1.0" encoding="utf-8"?>
 <p:sld xmlns:a="http://schemas.openxmlformats.org/drawingml/2006/main" xmlns:r="http://schemas.openxmlformats.org/officeDocument/2006/relationships" xmlns:p="http://schemas.openxmlformats.org/presentationml/2006/main">
   <p:cSld>
     <p:spTree>
@@ -26046,7 +25331,7 @@
               <a:pPr>
                 <a:defRPr/>
               </a:pPr>
-              <a:t>40</a:t>
+              <a:t>38</a:t>
             </a:fld>
             <a:endParaRPr lang="en-US" dirty="0"/>
           </a:p>
@@ -26096,7 +25381,7 @@
 </p:sld>
 </file>
 
-<file path=ppt/slides/slide41.xml><?xml version="1.0" encoding="utf-8"?>
+<file path=ppt/slides/slide39.xml><?xml version="1.0" encoding="utf-8"?>
 <p:sld xmlns:a="http://schemas.openxmlformats.org/drawingml/2006/main" xmlns:r="http://schemas.openxmlformats.org/officeDocument/2006/relationships" xmlns:p="http://schemas.openxmlformats.org/presentationml/2006/main">
   <p:cSld>
     <p:spTree>
@@ -26230,7 +25515,228 @@
 </p:sld>
 </file>
 
-<file path=ppt/slides/slide42.xml><?xml version="1.0" encoding="utf-8"?>
+<file path=ppt/slides/slide4.xml><?xml version="1.0" encoding="utf-8"?>
+<p:sld xmlns:a="http://schemas.openxmlformats.org/drawingml/2006/main" xmlns:r="http://schemas.openxmlformats.org/officeDocument/2006/relationships" xmlns:p="http://schemas.openxmlformats.org/presentationml/2006/main" showMasterPhAnim="0">
+  <p:cSld>
+    <p:spTree>
+      <p:nvGrpSpPr>
+        <p:cNvPr id="1" name=""/>
+        <p:cNvGrpSpPr/>
+        <p:nvPr/>
+      </p:nvGrpSpPr>
+      <p:grpSpPr>
+        <a:xfrm>
+          <a:off x="0" y="0"/>
+          <a:ext cx="0" cy="0"/>
+          <a:chOff x="0" y="0"/>
+          <a:chExt cx="0" cy="0"/>
+        </a:xfrm>
+      </p:grpSpPr>
+      <p:sp>
+        <p:nvSpPr>
+          <p:cNvPr id="473090" name="Rectangle 2"/>
+          <p:cNvSpPr>
+            <a:spLocks noGrp="1" noChangeArrowheads="1"/>
+          </p:cNvSpPr>
+          <p:nvPr>
+            <p:ph type="title"/>
+          </p:nvPr>
+        </p:nvSpPr>
+        <p:spPr/>
+        <p:txBody>
+          <a:bodyPr/>
+          <a:lstStyle/>
+          <a:p>
+            <a:r>
+              <a:rPr lang="en-US" sz="3600" dirty="0" smtClean="0"/>
+              <a:t>HTTP</a:t>
+            </a:r>
+            <a:endParaRPr lang="en-US" sz="3600" dirty="0"/>
+          </a:p>
+        </p:txBody>
+      </p:sp>
+      <p:sp>
+        <p:nvSpPr>
+          <p:cNvPr id="473091" name="Rectangle 3"/>
+          <p:cNvSpPr>
+            <a:spLocks noGrp="1" noChangeArrowheads="1"/>
+          </p:cNvSpPr>
+          <p:nvPr>
+            <p:ph idx="1"/>
+          </p:nvPr>
+        </p:nvSpPr>
+        <p:spPr/>
+        <p:txBody>
+          <a:bodyPr/>
+          <a:lstStyle/>
+          <a:p>
+            <a:pPr>
+              <a:lnSpc>
+                <a:spcPct val="100000"/>
+              </a:lnSpc>
+            </a:pPr>
+            <a:r>
+              <a:rPr lang="en-US" dirty="0">
+                <a:solidFill>
+                  <a:schemeClr val="accent5">
+                    <a:lumMod val="20000"/>
+                    <a:lumOff val="80000"/>
+                  </a:schemeClr>
+                </a:solidFill>
+              </a:rPr>
+              <a:t>Hyper Text Transfer Protocol (HTTP)</a:t>
+            </a:r>
+          </a:p>
+          <a:p>
+            <a:pPr lvl="1">
+              <a:lnSpc>
+                <a:spcPct val="100000"/>
+              </a:lnSpc>
+            </a:pPr>
+            <a:r>
+              <a:rPr lang="en-US" dirty="0"/>
+              <a:t>Client-server protocol for transferring Web </a:t>
+            </a:r>
+            <a:r>
+              <a:rPr lang="en-US" dirty="0" smtClean="0"/>
+              <a:t>resources (HTML files, images, styles, etc.)</a:t>
+            </a:r>
+            <a:endParaRPr lang="en-US" dirty="0"/>
+          </a:p>
+          <a:p>
+            <a:pPr>
+              <a:lnSpc>
+                <a:spcPct val="100000"/>
+              </a:lnSpc>
+            </a:pPr>
+            <a:r>
+              <a:rPr lang="en-US" dirty="0"/>
+              <a:t>Important properties of HTTP</a:t>
+            </a:r>
+          </a:p>
+          <a:p>
+            <a:pPr lvl="1">
+              <a:lnSpc>
+                <a:spcPct val="100000"/>
+              </a:lnSpc>
+            </a:pPr>
+            <a:r>
+              <a:rPr lang="en-US" dirty="0"/>
+              <a:t>Request-response </a:t>
+            </a:r>
+            <a:r>
+              <a:rPr lang="en-US" dirty="0" smtClean="0"/>
+              <a:t>model</a:t>
+            </a:r>
+            <a:endParaRPr lang="en-US" dirty="0"/>
+          </a:p>
+          <a:p>
+            <a:pPr lvl="1">
+              <a:lnSpc>
+                <a:spcPct val="100000"/>
+              </a:lnSpc>
+            </a:pPr>
+            <a:r>
+              <a:rPr lang="en-US" dirty="0"/>
+              <a:t>Text-based format</a:t>
+            </a:r>
+          </a:p>
+          <a:p>
+            <a:pPr lvl="1">
+              <a:lnSpc>
+                <a:spcPct val="100000"/>
+              </a:lnSpc>
+            </a:pPr>
+            <a:r>
+              <a:rPr lang="en-US" dirty="0" smtClean="0"/>
+              <a:t>Relies </a:t>
+            </a:r>
+            <a:r>
+              <a:rPr lang="en-US" dirty="0"/>
+              <a:t>on a </a:t>
+            </a:r>
+            <a:r>
+              <a:rPr lang="en-US" dirty="0" smtClean="0"/>
+              <a:t>unique resource URLs</a:t>
+            </a:r>
+            <a:endParaRPr lang="en-US" dirty="0"/>
+          </a:p>
+          <a:p>
+            <a:pPr lvl="1">
+              <a:lnSpc>
+                <a:spcPct val="100000"/>
+              </a:lnSpc>
+            </a:pPr>
+            <a:r>
+              <a:rPr lang="en-US" dirty="0" smtClean="0"/>
+              <a:t>Provides resource metadata (e.g. encoding)</a:t>
+            </a:r>
+            <a:endParaRPr lang="en-US" dirty="0"/>
+          </a:p>
+          <a:p>
+            <a:pPr lvl="1">
+              <a:lnSpc>
+                <a:spcPct val="100000"/>
+              </a:lnSpc>
+            </a:pPr>
+            <a:r>
+              <a:rPr lang="en-US" dirty="0" smtClean="0"/>
+              <a:t>Stateless (cookies can overcome this)</a:t>
+            </a:r>
+            <a:endParaRPr lang="en-US" dirty="0"/>
+          </a:p>
+        </p:txBody>
+      </p:sp>
+      <p:sp>
+        <p:nvSpPr>
+          <p:cNvPr id="4" name="Slide Number Placeholder 3"/>
+          <p:cNvSpPr>
+            <a:spLocks noGrp="1"/>
+          </p:cNvSpPr>
+          <p:nvPr>
+            <p:ph type="sldNum" sz="quarter" idx="10"/>
+          </p:nvPr>
+        </p:nvSpPr>
+        <p:spPr/>
+        <p:txBody>
+          <a:bodyPr/>
+          <a:lstStyle/>
+          <a:p>
+            <a:pPr>
+              <a:defRPr/>
+            </a:pPr>
+            <a:fld id="{58452FF4-89E3-4D1B-9927-2DBDC00E58D7}" type="slidenum">
+              <a:rPr lang="en-US" smtClean="0"/>
+              <a:pPr>
+                <a:defRPr/>
+              </a:pPr>
+              <a:t>4</a:t>
+            </a:fld>
+            <a:endParaRPr lang="en-US" dirty="0"/>
+          </a:p>
+        </p:txBody>
+      </p:sp>
+    </p:spTree>
+    <p:extLst>
+      <p:ext uri="{BB962C8B-B14F-4D97-AF65-F5344CB8AC3E}">
+        <p14:creationId xmlns:p14="http://schemas.microsoft.com/office/powerpoint/2010/main" val="2440486903"/>
+      </p:ext>
+    </p:extLst>
+  </p:cSld>
+  <p:clrMapOvr>
+    <a:masterClrMapping/>
+  </p:clrMapOvr>
+  <p:timing>
+    <p:tnLst>
+      <p:par>
+        <p:cTn id="1" dur="indefinite" restart="never" nodeType="tmRoot"/>
+      </p:par>
+    </p:tnLst>
+  </p:timing>
+</p:sld>
+</file>
+
+<file path=ppt/slides/slide40.xml><?xml version="1.0" encoding="utf-8"?>
 <p:sld xmlns:a="http://schemas.openxmlformats.org/drawingml/2006/main" xmlns:r="http://schemas.openxmlformats.org/officeDocument/2006/relationships" xmlns:p="http://schemas.openxmlformats.org/presentationml/2006/main">
   <p:cSld>
     <p:spTree>
@@ -26448,7 +25954,7 @@
 </p:sld>
 </file>
 
-<file path=ppt/slides/slide43.xml><?xml version="1.0" encoding="utf-8"?>
+<file path=ppt/slides/slide41.xml><?xml version="1.0" encoding="utf-8"?>
 <p:sld xmlns:a="http://schemas.openxmlformats.org/drawingml/2006/main" xmlns:r="http://schemas.openxmlformats.org/officeDocument/2006/relationships" xmlns:p="http://schemas.openxmlformats.org/presentationml/2006/main">
   <p:cSld>
     <p:spTree>
@@ -26595,7 +26101,7 @@
               <a:pPr>
                 <a:defRPr/>
               </a:pPr>
-              <a:t>43</a:t>
+              <a:t>41</a:t>
             </a:fld>
             <a:endParaRPr lang="en-US" dirty="0"/>
           </a:p>
@@ -26645,7 +26151,7 @@
 </p:sld>
 </file>
 
-<file path=ppt/slides/slide44.xml><?xml version="1.0" encoding="utf-8"?>
+<file path=ppt/slides/slide42.xml><?xml version="1.0" encoding="utf-8"?>
 <p:sld xmlns:a="http://schemas.openxmlformats.org/drawingml/2006/main" xmlns:r="http://schemas.openxmlformats.org/officeDocument/2006/relationships" xmlns:p="http://schemas.openxmlformats.org/presentationml/2006/main">
   <p:cSld>
     <p:spTree>
@@ -26783,7 +26289,7 @@
               <a:pPr>
                 <a:defRPr/>
               </a:pPr>
-              <a:t>44</a:t>
+              <a:t>42</a:t>
             </a:fld>
             <a:endParaRPr lang="en-US" dirty="0"/>
           </a:p>
@@ -26859,7 +26365,7 @@
 </p:sld>
 </file>
 
-<file path=ppt/slides/slide45.xml><?xml version="1.0" encoding="utf-8"?>
+<file path=ppt/slides/slide43.xml><?xml version="1.0" encoding="utf-8"?>
 <p:sld xmlns:a="http://schemas.openxmlformats.org/drawingml/2006/main" xmlns:r="http://schemas.openxmlformats.org/officeDocument/2006/relationships" xmlns:p="http://schemas.openxmlformats.org/presentationml/2006/main">
   <p:cSld>
     <p:bg>
@@ -26991,7 +26497,7 @@
               <a:pPr>
                 <a:defRPr/>
               </a:pPr>
-              <a:t>45</a:t>
+              <a:t>43</a:t>
             </a:fld>
             <a:endParaRPr lang="en-US" dirty="0"/>
           </a:p>
@@ -27336,7 +26842,7 @@
 </p:sld>
 </file>
 
-<file path=ppt/slides/slide46.xml><?xml version="1.0" encoding="utf-8"?>
+<file path=ppt/slides/slide44.xml><?xml version="1.0" encoding="utf-8"?>
 <p:sld xmlns:a="http://schemas.openxmlformats.org/drawingml/2006/main" xmlns:r="http://schemas.openxmlformats.org/officeDocument/2006/relationships" xmlns:p="http://schemas.openxmlformats.org/presentationml/2006/main">
   <p:cSld>
     <p:spTree>
@@ -27442,7 +26948,7 @@
 </p:sld>
 </file>
 
-<file path=ppt/slides/slide47.xml><?xml version="1.0" encoding="utf-8"?>
+<file path=ppt/slides/slide45.xml><?xml version="1.0" encoding="utf-8"?>
 <p:sld xmlns:a="http://schemas.openxmlformats.org/drawingml/2006/main" xmlns:r="http://schemas.openxmlformats.org/officeDocument/2006/relationships" xmlns:p="http://schemas.openxmlformats.org/presentationml/2006/main">
   <p:cSld>
     <p:spTree>
@@ -27616,7 +27122,7 @@
               <a:pPr>
                 <a:defRPr/>
               </a:pPr>
-              <a:t>47</a:t>
+              <a:t>45</a:t>
             </a:fld>
             <a:endParaRPr lang="en-US" dirty="0"/>
           </a:p>
@@ -27642,7 +27148,7 @@
 </p:sld>
 </file>
 
-<file path=ppt/slides/slide48.xml><?xml version="1.0" encoding="utf-8"?>
+<file path=ppt/slides/slide46.xml><?xml version="1.0" encoding="utf-8"?>
 <p:sld xmlns:a="http://schemas.openxmlformats.org/drawingml/2006/main" xmlns:r="http://schemas.openxmlformats.org/officeDocument/2006/relationships" xmlns:p="http://schemas.openxmlformats.org/presentationml/2006/main">
   <p:cSld>
     <p:spTree>
@@ -27742,7 +27248,7 @@
 </p:sld>
 </file>
 
-<file path=ppt/slides/slide49.xml><?xml version="1.0" encoding="utf-8"?>
+<file path=ppt/slides/slide47.xml><?xml version="1.0" encoding="utf-8"?>
 <p:sld xmlns:a="http://schemas.openxmlformats.org/drawingml/2006/main" xmlns:r="http://schemas.openxmlformats.org/officeDocument/2006/relationships" xmlns:p="http://schemas.openxmlformats.org/presentationml/2006/main">
   <p:cSld>
     <p:spTree>
@@ -28205,7 +27711,7 @@
               <a:pPr>
                 <a:defRPr/>
               </a:pPr>
-              <a:t>49</a:t>
+              <a:t>47</a:t>
             </a:fld>
             <a:endParaRPr lang="en-US" dirty="0"/>
           </a:p>

</xml_diff>